<commit_message>
Work on the protocol description
</commit_message>
<xml_diff>
--- a/introdemo/Illustrations/Illustrations (Introduction to LabBench).pptx
+++ b/introdemo/Illustrations/Illustrations (Introduction to LabBench).pptx
@@ -4,9 +4,13 @@
   <p:sldMasterIdLst>
     <p:sldMasterId id="2147483648" r:id="rId1"/>
   </p:sldMasterIdLst>
+  <p:notesMasterIdLst>
+    <p:notesMasterId r:id="rId5"/>
+  </p:notesMasterIdLst>
   <p:sldIdLst>
     <p:sldId id="256" r:id="rId2"/>
     <p:sldId id="257" r:id="rId3"/>
+    <p:sldId id="258" r:id="rId4"/>
   </p:sldIdLst>
   <p:sldSz cx="12192000" cy="6858000"/>
   <p:notesSz cx="6858000" cy="9144000"/>
@@ -106,6 +110,536 @@
     </a:lvl9pPr>
   </p:defaultTextStyle>
 </p:presentation>
+</file>
+
+<file path=ppt/notesMasters/notesMaster1.xml><?xml version="1.0" encoding="utf-8"?>
+<p:notesMaster xmlns:a="http://schemas.openxmlformats.org/drawingml/2006/main" xmlns:r="http://schemas.openxmlformats.org/officeDocument/2006/relationships" xmlns:p="http://schemas.openxmlformats.org/presentationml/2006/main">
+  <p:cSld>
+    <p:bg>
+      <p:bgRef idx="1001">
+        <a:schemeClr val="bg1"/>
+      </p:bgRef>
+    </p:bg>
+    <p:spTree>
+      <p:nvGrpSpPr>
+        <p:cNvPr id="1" name=""/>
+        <p:cNvGrpSpPr/>
+        <p:nvPr/>
+      </p:nvGrpSpPr>
+      <p:grpSpPr>
+        <a:xfrm>
+          <a:off x="0" y="0"/>
+          <a:ext cx="0" cy="0"/>
+          <a:chOff x="0" y="0"/>
+          <a:chExt cx="0" cy="0"/>
+        </a:xfrm>
+      </p:grpSpPr>
+      <p:sp>
+        <p:nvSpPr>
+          <p:cNvPr id="2" name="Header Placeholder 1"/>
+          <p:cNvSpPr>
+            <a:spLocks noGrp="1"/>
+          </p:cNvSpPr>
+          <p:nvPr>
+            <p:ph type="hdr" sz="quarter"/>
+          </p:nvPr>
+        </p:nvSpPr>
+        <p:spPr>
+          <a:xfrm>
+            <a:off x="0" y="0"/>
+            <a:ext cx="2971800" cy="458788"/>
+          </a:xfrm>
+          <a:prstGeom prst="rect">
+            <a:avLst/>
+          </a:prstGeom>
+        </p:spPr>
+        <p:txBody>
+          <a:bodyPr vert="horz" lIns="91440" tIns="45720" rIns="91440" bIns="45720" rtlCol="0"/>
+          <a:lstStyle>
+            <a:lvl1pPr algn="l">
+              <a:defRPr sz="1200"/>
+            </a:lvl1pPr>
+          </a:lstStyle>
+          <a:p>
+            <a:endParaRPr lang="en-DK"/>
+          </a:p>
+        </p:txBody>
+      </p:sp>
+      <p:sp>
+        <p:nvSpPr>
+          <p:cNvPr id="3" name="Date Placeholder 2"/>
+          <p:cNvSpPr>
+            <a:spLocks noGrp="1"/>
+          </p:cNvSpPr>
+          <p:nvPr>
+            <p:ph type="dt" idx="1"/>
+          </p:nvPr>
+        </p:nvSpPr>
+        <p:spPr>
+          <a:xfrm>
+            <a:off x="3884613" y="0"/>
+            <a:ext cx="2971800" cy="458788"/>
+          </a:xfrm>
+          <a:prstGeom prst="rect">
+            <a:avLst/>
+          </a:prstGeom>
+        </p:spPr>
+        <p:txBody>
+          <a:bodyPr vert="horz" lIns="91440" tIns="45720" rIns="91440" bIns="45720" rtlCol="0"/>
+          <a:lstStyle>
+            <a:lvl1pPr algn="r">
+              <a:defRPr sz="1200"/>
+            </a:lvl1pPr>
+          </a:lstStyle>
+          <a:p>
+            <a:fld id="{2D646BAE-8E37-4DBA-A74E-0A3DD4A9F90C}" type="datetimeFigureOut">
+              <a:rPr lang="en-DK" smtClean="0"/>
+              <a:t>24/12/2024</a:t>
+            </a:fld>
+            <a:endParaRPr lang="en-DK"/>
+          </a:p>
+        </p:txBody>
+      </p:sp>
+      <p:sp>
+        <p:nvSpPr>
+          <p:cNvPr id="4" name="Slide Image Placeholder 3"/>
+          <p:cNvSpPr>
+            <a:spLocks noGrp="1" noRot="1" noChangeAspect="1"/>
+          </p:cNvSpPr>
+          <p:nvPr>
+            <p:ph type="sldImg" idx="2"/>
+          </p:nvPr>
+        </p:nvSpPr>
+        <p:spPr>
+          <a:xfrm>
+            <a:off x="685800" y="1143000"/>
+            <a:ext cx="5486400" cy="3086100"/>
+          </a:xfrm>
+          <a:prstGeom prst="rect">
+            <a:avLst/>
+          </a:prstGeom>
+          <a:noFill/>
+          <a:ln w="12700">
+            <a:solidFill>
+              <a:prstClr val="black"/>
+            </a:solidFill>
+          </a:ln>
+        </p:spPr>
+        <p:txBody>
+          <a:bodyPr vert="horz" lIns="91440" tIns="45720" rIns="91440" bIns="45720" rtlCol="0" anchor="ctr"/>
+          <a:lstStyle/>
+          <a:p>
+            <a:endParaRPr lang="en-DK"/>
+          </a:p>
+        </p:txBody>
+      </p:sp>
+      <p:sp>
+        <p:nvSpPr>
+          <p:cNvPr id="5" name="Notes Placeholder 4"/>
+          <p:cNvSpPr>
+            <a:spLocks noGrp="1"/>
+          </p:cNvSpPr>
+          <p:nvPr>
+            <p:ph type="body" sz="quarter" idx="3"/>
+          </p:nvPr>
+        </p:nvSpPr>
+        <p:spPr>
+          <a:xfrm>
+            <a:off x="685800" y="4400550"/>
+            <a:ext cx="5486400" cy="3600450"/>
+          </a:xfrm>
+          <a:prstGeom prst="rect">
+            <a:avLst/>
+          </a:prstGeom>
+        </p:spPr>
+        <p:txBody>
+          <a:bodyPr vert="horz" lIns="91440" tIns="45720" rIns="91440" bIns="45720" rtlCol="0"/>
+          <a:lstStyle/>
+          <a:p>
+            <a:pPr lvl="0"/>
+            <a:r>
+              <a:rPr lang="en-US"/>
+              <a:t>Click to edit Master text styles</a:t>
+            </a:r>
+          </a:p>
+          <a:p>
+            <a:pPr lvl="1"/>
+            <a:r>
+              <a:rPr lang="en-US"/>
+              <a:t>Second level</a:t>
+            </a:r>
+          </a:p>
+          <a:p>
+            <a:pPr lvl="2"/>
+            <a:r>
+              <a:rPr lang="en-US"/>
+              <a:t>Third level</a:t>
+            </a:r>
+          </a:p>
+          <a:p>
+            <a:pPr lvl="3"/>
+            <a:r>
+              <a:rPr lang="en-US"/>
+              <a:t>Fourth level</a:t>
+            </a:r>
+          </a:p>
+          <a:p>
+            <a:pPr lvl="4"/>
+            <a:r>
+              <a:rPr lang="en-US"/>
+              <a:t>Fifth level</a:t>
+            </a:r>
+            <a:endParaRPr lang="en-DK"/>
+          </a:p>
+        </p:txBody>
+      </p:sp>
+      <p:sp>
+        <p:nvSpPr>
+          <p:cNvPr id="6" name="Footer Placeholder 5"/>
+          <p:cNvSpPr>
+            <a:spLocks noGrp="1"/>
+          </p:cNvSpPr>
+          <p:nvPr>
+            <p:ph type="ftr" sz="quarter" idx="4"/>
+          </p:nvPr>
+        </p:nvSpPr>
+        <p:spPr>
+          <a:xfrm>
+            <a:off x="0" y="8685213"/>
+            <a:ext cx="2971800" cy="458787"/>
+          </a:xfrm>
+          <a:prstGeom prst="rect">
+            <a:avLst/>
+          </a:prstGeom>
+        </p:spPr>
+        <p:txBody>
+          <a:bodyPr vert="horz" lIns="91440" tIns="45720" rIns="91440" bIns="45720" rtlCol="0" anchor="b"/>
+          <a:lstStyle>
+            <a:lvl1pPr algn="l">
+              <a:defRPr sz="1200"/>
+            </a:lvl1pPr>
+          </a:lstStyle>
+          <a:p>
+            <a:endParaRPr lang="en-DK"/>
+          </a:p>
+        </p:txBody>
+      </p:sp>
+      <p:sp>
+        <p:nvSpPr>
+          <p:cNvPr id="7" name="Slide Number Placeholder 6"/>
+          <p:cNvSpPr>
+            <a:spLocks noGrp="1"/>
+          </p:cNvSpPr>
+          <p:nvPr>
+            <p:ph type="sldNum" sz="quarter" idx="5"/>
+          </p:nvPr>
+        </p:nvSpPr>
+        <p:spPr>
+          <a:xfrm>
+            <a:off x="3884613" y="8685213"/>
+            <a:ext cx="2971800" cy="458787"/>
+          </a:xfrm>
+          <a:prstGeom prst="rect">
+            <a:avLst/>
+          </a:prstGeom>
+        </p:spPr>
+        <p:txBody>
+          <a:bodyPr vert="horz" lIns="91440" tIns="45720" rIns="91440" bIns="45720" rtlCol="0" anchor="b"/>
+          <a:lstStyle>
+            <a:lvl1pPr algn="r">
+              <a:defRPr sz="1200"/>
+            </a:lvl1pPr>
+          </a:lstStyle>
+          <a:p>
+            <a:fld id="{013998F9-4E6E-4F05-BAC2-F95D22B0FDB7}" type="slidenum">
+              <a:rPr lang="en-DK" smtClean="0"/>
+              <a:t>‹#›</a:t>
+            </a:fld>
+            <a:endParaRPr lang="en-DK"/>
+          </a:p>
+        </p:txBody>
+      </p:sp>
+    </p:spTree>
+    <p:extLst>
+      <p:ext uri="{BB962C8B-B14F-4D97-AF65-F5344CB8AC3E}">
+        <p14:creationId xmlns:p14="http://schemas.microsoft.com/office/powerpoint/2010/main" val="969131728"/>
+      </p:ext>
+    </p:extLst>
+  </p:cSld>
+  <p:clrMap bg1="lt1" tx1="dk1" bg2="lt2" tx2="dk2" accent1="accent1" accent2="accent2" accent3="accent3" accent4="accent4" accent5="accent5" accent6="accent6" hlink="hlink" folHlink="folHlink"/>
+  <p:notesStyle>
+    <a:lvl1pPr marL="0" algn="l" defTabSz="914400" rtl="0" eaLnBrk="1" latinLnBrk="0" hangingPunct="1">
+      <a:defRPr sz="1200" kern="1200">
+        <a:solidFill>
+          <a:schemeClr val="tx1"/>
+        </a:solidFill>
+        <a:latin typeface="+mn-lt"/>
+        <a:ea typeface="+mn-ea"/>
+        <a:cs typeface="+mn-cs"/>
+      </a:defRPr>
+    </a:lvl1pPr>
+    <a:lvl2pPr marL="457200" algn="l" defTabSz="914400" rtl="0" eaLnBrk="1" latinLnBrk="0" hangingPunct="1">
+      <a:defRPr sz="1200" kern="1200">
+        <a:solidFill>
+          <a:schemeClr val="tx1"/>
+        </a:solidFill>
+        <a:latin typeface="+mn-lt"/>
+        <a:ea typeface="+mn-ea"/>
+        <a:cs typeface="+mn-cs"/>
+      </a:defRPr>
+    </a:lvl2pPr>
+    <a:lvl3pPr marL="914400" algn="l" defTabSz="914400" rtl="0" eaLnBrk="1" latinLnBrk="0" hangingPunct="1">
+      <a:defRPr sz="1200" kern="1200">
+        <a:solidFill>
+          <a:schemeClr val="tx1"/>
+        </a:solidFill>
+        <a:latin typeface="+mn-lt"/>
+        <a:ea typeface="+mn-ea"/>
+        <a:cs typeface="+mn-cs"/>
+      </a:defRPr>
+    </a:lvl3pPr>
+    <a:lvl4pPr marL="1371600" algn="l" defTabSz="914400" rtl="0" eaLnBrk="1" latinLnBrk="0" hangingPunct="1">
+      <a:defRPr sz="1200" kern="1200">
+        <a:solidFill>
+          <a:schemeClr val="tx1"/>
+        </a:solidFill>
+        <a:latin typeface="+mn-lt"/>
+        <a:ea typeface="+mn-ea"/>
+        <a:cs typeface="+mn-cs"/>
+      </a:defRPr>
+    </a:lvl4pPr>
+    <a:lvl5pPr marL="1828800" algn="l" defTabSz="914400" rtl="0" eaLnBrk="1" latinLnBrk="0" hangingPunct="1">
+      <a:defRPr sz="1200" kern="1200">
+        <a:solidFill>
+          <a:schemeClr val="tx1"/>
+        </a:solidFill>
+        <a:latin typeface="+mn-lt"/>
+        <a:ea typeface="+mn-ea"/>
+        <a:cs typeface="+mn-cs"/>
+      </a:defRPr>
+    </a:lvl5pPr>
+    <a:lvl6pPr marL="2286000" algn="l" defTabSz="914400" rtl="0" eaLnBrk="1" latinLnBrk="0" hangingPunct="1">
+      <a:defRPr sz="1200" kern="1200">
+        <a:solidFill>
+          <a:schemeClr val="tx1"/>
+        </a:solidFill>
+        <a:latin typeface="+mn-lt"/>
+        <a:ea typeface="+mn-ea"/>
+        <a:cs typeface="+mn-cs"/>
+      </a:defRPr>
+    </a:lvl6pPr>
+    <a:lvl7pPr marL="2743200" algn="l" defTabSz="914400" rtl="0" eaLnBrk="1" latinLnBrk="0" hangingPunct="1">
+      <a:defRPr sz="1200" kern="1200">
+        <a:solidFill>
+          <a:schemeClr val="tx1"/>
+        </a:solidFill>
+        <a:latin typeface="+mn-lt"/>
+        <a:ea typeface="+mn-ea"/>
+        <a:cs typeface="+mn-cs"/>
+      </a:defRPr>
+    </a:lvl7pPr>
+    <a:lvl8pPr marL="3200400" algn="l" defTabSz="914400" rtl="0" eaLnBrk="1" latinLnBrk="0" hangingPunct="1">
+      <a:defRPr sz="1200" kern="1200">
+        <a:solidFill>
+          <a:schemeClr val="tx1"/>
+        </a:solidFill>
+        <a:latin typeface="+mn-lt"/>
+        <a:ea typeface="+mn-ea"/>
+        <a:cs typeface="+mn-cs"/>
+      </a:defRPr>
+    </a:lvl8pPr>
+    <a:lvl9pPr marL="3657600" algn="l" defTabSz="914400" rtl="0" eaLnBrk="1" latinLnBrk="0" hangingPunct="1">
+      <a:defRPr sz="1200" kern="1200">
+        <a:solidFill>
+          <a:schemeClr val="tx1"/>
+        </a:solidFill>
+        <a:latin typeface="+mn-lt"/>
+        <a:ea typeface="+mn-ea"/>
+        <a:cs typeface="+mn-cs"/>
+      </a:defRPr>
+    </a:lvl9pPr>
+  </p:notesStyle>
+</p:notesMaster>
+</file>
+
+<file path=ppt/notesSlides/notesSlide1.xml><?xml version="1.0" encoding="utf-8"?>
+<p:notes xmlns:a="http://schemas.openxmlformats.org/drawingml/2006/main" xmlns:r="http://schemas.openxmlformats.org/officeDocument/2006/relationships" xmlns:p="http://schemas.openxmlformats.org/presentationml/2006/main">
+  <p:cSld>
+    <p:spTree>
+      <p:nvGrpSpPr>
+        <p:cNvPr id="1" name=""/>
+        <p:cNvGrpSpPr/>
+        <p:nvPr/>
+      </p:nvGrpSpPr>
+      <p:grpSpPr>
+        <a:xfrm>
+          <a:off x="0" y="0"/>
+          <a:ext cx="0" cy="0"/>
+          <a:chOff x="0" y="0"/>
+          <a:chExt cx="0" cy="0"/>
+        </a:xfrm>
+      </p:grpSpPr>
+      <p:sp>
+        <p:nvSpPr>
+          <p:cNvPr id="2" name="Slide Image Placeholder 1"/>
+          <p:cNvSpPr>
+            <a:spLocks noGrp="1" noRot="1" noChangeAspect="1"/>
+          </p:cNvSpPr>
+          <p:nvPr>
+            <p:ph type="sldImg"/>
+          </p:nvPr>
+        </p:nvSpPr>
+        <p:spPr/>
+      </p:sp>
+      <p:sp>
+        <p:nvSpPr>
+          <p:cNvPr id="3" name="Notes Placeholder 2"/>
+          <p:cNvSpPr>
+            <a:spLocks noGrp="1"/>
+          </p:cNvSpPr>
+          <p:nvPr>
+            <p:ph type="body" idx="1"/>
+          </p:nvPr>
+        </p:nvSpPr>
+        <p:spPr/>
+        <p:txBody>
+          <a:bodyPr/>
+          <a:lstStyle/>
+          <a:p>
+            <a:r>
+              <a:rPr lang="en-GB" dirty="0"/>
+              <a:t>Joystick Experimental Setup</a:t>
+            </a:r>
+            <a:endParaRPr lang="en-DK" dirty="0"/>
+          </a:p>
+        </p:txBody>
+      </p:sp>
+      <p:sp>
+        <p:nvSpPr>
+          <p:cNvPr id="4" name="Slide Number Placeholder 3"/>
+          <p:cNvSpPr>
+            <a:spLocks noGrp="1"/>
+          </p:cNvSpPr>
+          <p:nvPr>
+            <p:ph type="sldNum" sz="quarter" idx="5"/>
+          </p:nvPr>
+        </p:nvSpPr>
+        <p:spPr/>
+        <p:txBody>
+          <a:bodyPr/>
+          <a:lstStyle/>
+          <a:p>
+            <a:fld id="{013998F9-4E6E-4F05-BAC2-F95D22B0FDB7}" type="slidenum">
+              <a:rPr lang="en-DK" smtClean="0"/>
+              <a:t>2</a:t>
+            </a:fld>
+            <a:endParaRPr lang="en-DK"/>
+          </a:p>
+        </p:txBody>
+      </p:sp>
+    </p:spTree>
+    <p:extLst>
+      <p:ext uri="{BB962C8B-B14F-4D97-AF65-F5344CB8AC3E}">
+        <p14:creationId xmlns:p14="http://schemas.microsoft.com/office/powerpoint/2010/main" val="3496583598"/>
+      </p:ext>
+    </p:extLst>
+  </p:cSld>
+  <p:clrMapOvr>
+    <a:masterClrMapping/>
+  </p:clrMapOvr>
+</p:notes>
+</file>
+
+<file path=ppt/notesSlides/notesSlide2.xml><?xml version="1.0" encoding="utf-8"?>
+<p:notes xmlns:a="http://schemas.openxmlformats.org/drawingml/2006/main" xmlns:r="http://schemas.openxmlformats.org/officeDocument/2006/relationships" xmlns:p="http://schemas.openxmlformats.org/presentationml/2006/main">
+  <p:cSld>
+    <p:spTree>
+      <p:nvGrpSpPr>
+        <p:cNvPr id="1" name=""/>
+        <p:cNvGrpSpPr/>
+        <p:nvPr/>
+      </p:nvGrpSpPr>
+      <p:grpSpPr>
+        <a:xfrm>
+          <a:off x="0" y="0"/>
+          <a:ext cx="0" cy="0"/>
+          <a:chOff x="0" y="0"/>
+          <a:chExt cx="0" cy="0"/>
+        </a:xfrm>
+      </p:grpSpPr>
+      <p:sp>
+        <p:nvSpPr>
+          <p:cNvPr id="2" name="Slide Image Placeholder 1"/>
+          <p:cNvSpPr>
+            <a:spLocks noGrp="1" noRot="1" noChangeAspect="1"/>
+          </p:cNvSpPr>
+          <p:nvPr>
+            <p:ph type="sldImg"/>
+          </p:nvPr>
+        </p:nvSpPr>
+        <p:spPr/>
+      </p:sp>
+      <p:sp>
+        <p:nvSpPr>
+          <p:cNvPr id="3" name="Notes Placeholder 2"/>
+          <p:cNvSpPr>
+            <a:spLocks noGrp="1"/>
+          </p:cNvSpPr>
+          <p:nvPr>
+            <p:ph type="body" idx="1"/>
+          </p:nvPr>
+        </p:nvSpPr>
+        <p:spPr/>
+        <p:txBody>
+          <a:bodyPr/>
+          <a:lstStyle/>
+          <a:p>
+            <a:r>
+              <a:rPr lang="en-GB" dirty="0"/>
+              <a:t>LabBench I/</a:t>
+            </a:r>
+            <a:r>
+              <a:rPr lang="en-GB"/>
+              <a:t>O Experimental Setup</a:t>
+            </a:r>
+            <a:endParaRPr lang="en-DK"/>
+          </a:p>
+        </p:txBody>
+      </p:sp>
+      <p:sp>
+        <p:nvSpPr>
+          <p:cNvPr id="4" name="Slide Number Placeholder 3"/>
+          <p:cNvSpPr>
+            <a:spLocks noGrp="1"/>
+          </p:cNvSpPr>
+          <p:nvPr>
+            <p:ph type="sldNum" sz="quarter" idx="5"/>
+          </p:nvPr>
+        </p:nvSpPr>
+        <p:spPr/>
+        <p:txBody>
+          <a:bodyPr/>
+          <a:lstStyle/>
+          <a:p>
+            <a:fld id="{013998F9-4E6E-4F05-BAC2-F95D22B0FDB7}" type="slidenum">
+              <a:rPr lang="en-DK" smtClean="0"/>
+              <a:t>3</a:t>
+            </a:fld>
+            <a:endParaRPr lang="en-DK"/>
+          </a:p>
+        </p:txBody>
+      </p:sp>
+    </p:spTree>
+    <p:extLst>
+      <p:ext uri="{BB962C8B-B14F-4D97-AF65-F5344CB8AC3E}">
+        <p14:creationId xmlns:p14="http://schemas.microsoft.com/office/powerpoint/2010/main" val="1290388804"/>
+      </p:ext>
+    </p:extLst>
+  </p:cSld>
+  <p:clrMapOvr>
+    <a:masterClrMapping/>
+  </p:clrMapOvr>
+</p:notes>
 </file>
 
 <file path=ppt/slideLayouts/slideLayout1.xml><?xml version="1.0" encoding="utf-8"?>
@@ -3435,6 +3969,36 @@
     <p:extLst>
       <p:ext uri="{BB962C8B-B14F-4D97-AF65-F5344CB8AC3E}">
         <p14:creationId xmlns:p14="http://schemas.microsoft.com/office/powerpoint/2010/main" val="1165474774"/>
+      </p:ext>
+    </p:extLst>
+  </p:cSld>
+  <p:clrMapOvr>
+    <a:masterClrMapping/>
+  </p:clrMapOvr>
+</p:sld>
+</file>
+
+<file path=ppt/slides/slide3.xml><?xml version="1.0" encoding="utf-8"?>
+<p:sld xmlns:a="http://schemas.openxmlformats.org/drawingml/2006/main" xmlns:r="http://schemas.openxmlformats.org/officeDocument/2006/relationships" xmlns:p="http://schemas.openxmlformats.org/presentationml/2006/main">
+  <p:cSld>
+    <p:spTree>
+      <p:nvGrpSpPr>
+        <p:cNvPr id="1" name=""/>
+        <p:cNvGrpSpPr/>
+        <p:nvPr/>
+      </p:nvGrpSpPr>
+      <p:grpSpPr>
+        <a:xfrm>
+          <a:off x="0" y="0"/>
+          <a:ext cx="0" cy="0"/>
+          <a:chOff x="0" y="0"/>
+          <a:chExt cx="0" cy="0"/>
+        </a:xfrm>
+      </p:grpSpPr>
+    </p:spTree>
+    <p:extLst>
+      <p:ext uri="{BB962C8B-B14F-4D97-AF65-F5344CB8AC3E}">
+        <p14:creationId xmlns:p14="http://schemas.microsoft.com/office/powerpoint/2010/main" val="4072599821"/>
       </p:ext>
     </p:extLst>
   </p:cSld>
@@ -3757,4 +4321,319 @@
     </a:ext>
   </a:extLst>
 </a:theme>
+</file>
+
+<file path=ppt/theme/theme2.xml><?xml version="1.0" encoding="utf-8"?>
+<a:theme xmlns:a="http://schemas.openxmlformats.org/drawingml/2006/main" name="Office Theme">
+  <a:themeElements>
+    <a:clrScheme name="Office">
+      <a:dk1>
+        <a:sysClr val="windowText" lastClr="000000"/>
+      </a:dk1>
+      <a:lt1>
+        <a:sysClr val="window" lastClr="FFFFFF"/>
+      </a:lt1>
+      <a:dk2>
+        <a:srgbClr val="0E2841"/>
+      </a:dk2>
+      <a:lt2>
+        <a:srgbClr val="E8E8E8"/>
+      </a:lt2>
+      <a:accent1>
+        <a:srgbClr val="156082"/>
+      </a:accent1>
+      <a:accent2>
+        <a:srgbClr val="E97132"/>
+      </a:accent2>
+      <a:accent3>
+        <a:srgbClr val="196B24"/>
+      </a:accent3>
+      <a:accent4>
+        <a:srgbClr val="0F9ED5"/>
+      </a:accent4>
+      <a:accent5>
+        <a:srgbClr val="A02B93"/>
+      </a:accent5>
+      <a:accent6>
+        <a:srgbClr val="4EA72E"/>
+      </a:accent6>
+      <a:hlink>
+        <a:srgbClr val="467886"/>
+      </a:hlink>
+      <a:folHlink>
+        <a:srgbClr val="96607D"/>
+      </a:folHlink>
+    </a:clrScheme>
+    <a:fontScheme name="Office">
+      <a:majorFont>
+        <a:latin typeface="Aptos Display" panose="02110004020202020204"/>
+        <a:ea typeface=""/>
+        <a:cs typeface=""/>
+        <a:font script="Jpan" typeface="游ゴシック Light"/>
+        <a:font script="Hang" typeface="맑은 고딕"/>
+        <a:font script="Hans" typeface="等线 Light"/>
+        <a:font script="Hant" typeface="新細明體"/>
+        <a:font script="Arab" typeface="Times New Roman"/>
+        <a:font script="Hebr" typeface="Times New Roman"/>
+        <a:font script="Thai" typeface="Angsana New"/>
+        <a:font script="Ethi" typeface="Nyala"/>
+        <a:font script="Beng" typeface="Vrinda"/>
+        <a:font script="Gujr" typeface="Shruti"/>
+        <a:font script="Khmr" typeface="MoolBoran"/>
+        <a:font script="Knda" typeface="Tunga"/>
+        <a:font script="Guru" typeface="Raavi"/>
+        <a:font script="Cans" typeface="Euphemia"/>
+        <a:font script="Cher" typeface="Plantagenet Cherokee"/>
+        <a:font script="Yiii" typeface="Microsoft Yi Baiti"/>
+        <a:font script="Tibt" typeface="Microsoft Himalaya"/>
+        <a:font script="Thaa" typeface="MV Boli"/>
+        <a:font script="Deva" typeface="Mangal"/>
+        <a:font script="Telu" typeface="Gautami"/>
+        <a:font script="Taml" typeface="Latha"/>
+        <a:font script="Syrc" typeface="Estrangelo Edessa"/>
+        <a:font script="Orya" typeface="Kalinga"/>
+        <a:font script="Mlym" typeface="Kartika"/>
+        <a:font script="Laoo" typeface="DokChampa"/>
+        <a:font script="Sinh" typeface="Iskoola Pota"/>
+        <a:font script="Mong" typeface="Mongolian Baiti"/>
+        <a:font script="Viet" typeface="Times New Roman"/>
+        <a:font script="Uigh" typeface="Microsoft Uighur"/>
+        <a:font script="Geor" typeface="Sylfaen"/>
+        <a:font script="Armn" typeface="Arial"/>
+        <a:font script="Bugi" typeface="Leelawadee UI"/>
+        <a:font script="Bopo" typeface="Microsoft JhengHei"/>
+        <a:font script="Java" typeface="Javanese Text"/>
+        <a:font script="Lisu" typeface="Segoe UI"/>
+        <a:font script="Mymr" typeface="Myanmar Text"/>
+        <a:font script="Nkoo" typeface="Ebrima"/>
+        <a:font script="Olck" typeface="Nirmala UI"/>
+        <a:font script="Osma" typeface="Ebrima"/>
+        <a:font script="Phag" typeface="Phagspa"/>
+        <a:font script="Syrn" typeface="Estrangelo Edessa"/>
+        <a:font script="Syrj" typeface="Estrangelo Edessa"/>
+        <a:font script="Syre" typeface="Estrangelo Edessa"/>
+        <a:font script="Sora" typeface="Nirmala UI"/>
+        <a:font script="Tale" typeface="Microsoft Tai Le"/>
+        <a:font script="Talu" typeface="Microsoft New Tai Lue"/>
+        <a:font script="Tfng" typeface="Ebrima"/>
+      </a:majorFont>
+      <a:minorFont>
+        <a:latin typeface="Aptos" panose="02110004020202020204"/>
+        <a:ea typeface=""/>
+        <a:cs typeface=""/>
+        <a:font script="Jpan" typeface="游ゴシック"/>
+        <a:font script="Hang" typeface="맑은 고딕"/>
+        <a:font script="Hans" typeface="等线"/>
+        <a:font script="Hant" typeface="新細明體"/>
+        <a:font script="Arab" typeface="Arial"/>
+        <a:font script="Hebr" typeface="Arial"/>
+        <a:font script="Thai" typeface="Cordia New"/>
+        <a:font script="Ethi" typeface="Nyala"/>
+        <a:font script="Beng" typeface="Vrinda"/>
+        <a:font script="Gujr" typeface="Shruti"/>
+        <a:font script="Khmr" typeface="DaunPenh"/>
+        <a:font script="Knda" typeface="Tunga"/>
+        <a:font script="Guru" typeface="Raavi"/>
+        <a:font script="Cans" typeface="Euphemia"/>
+        <a:font script="Cher" typeface="Plantagenet Cherokee"/>
+        <a:font script="Yiii" typeface="Microsoft Yi Baiti"/>
+        <a:font script="Tibt" typeface="Microsoft Himalaya"/>
+        <a:font script="Thaa" typeface="MV Boli"/>
+        <a:font script="Deva" typeface="Mangal"/>
+        <a:font script="Telu" typeface="Gautami"/>
+        <a:font script="Taml" typeface="Latha"/>
+        <a:font script="Syrc" typeface="Estrangelo Edessa"/>
+        <a:font script="Orya" typeface="Kalinga"/>
+        <a:font script="Mlym" typeface="Kartika"/>
+        <a:font script="Laoo" typeface="DokChampa"/>
+        <a:font script="Sinh" typeface="Iskoola Pota"/>
+        <a:font script="Mong" typeface="Mongolian Baiti"/>
+        <a:font script="Viet" typeface="Arial"/>
+        <a:font script="Uigh" typeface="Microsoft Uighur"/>
+        <a:font script="Geor" typeface="Sylfaen"/>
+        <a:font script="Armn" typeface="Arial"/>
+        <a:font script="Bugi" typeface="Leelawadee UI"/>
+        <a:font script="Bopo" typeface="Microsoft JhengHei"/>
+        <a:font script="Java" typeface="Javanese Text"/>
+        <a:font script="Lisu" typeface="Segoe UI"/>
+        <a:font script="Mymr" typeface="Myanmar Text"/>
+        <a:font script="Nkoo" typeface="Ebrima"/>
+        <a:font script="Olck" typeface="Nirmala UI"/>
+        <a:font script="Osma" typeface="Ebrima"/>
+        <a:font script="Phag" typeface="Phagspa"/>
+        <a:font script="Syrn" typeface="Estrangelo Edessa"/>
+        <a:font script="Syrj" typeface="Estrangelo Edessa"/>
+        <a:font script="Syre" typeface="Estrangelo Edessa"/>
+        <a:font script="Sora" typeface="Nirmala UI"/>
+        <a:font script="Tale" typeface="Microsoft Tai Le"/>
+        <a:font script="Talu" typeface="Microsoft New Tai Lue"/>
+        <a:font script="Tfng" typeface="Ebrima"/>
+      </a:minorFont>
+    </a:fontScheme>
+    <a:fmtScheme name="Office">
+      <a:fillStyleLst>
+        <a:solidFill>
+          <a:schemeClr val="phClr"/>
+        </a:solidFill>
+        <a:gradFill rotWithShape="1">
+          <a:gsLst>
+            <a:gs pos="0">
+              <a:schemeClr val="phClr">
+                <a:lumMod val="110000"/>
+                <a:satMod val="105000"/>
+                <a:tint val="67000"/>
+              </a:schemeClr>
+            </a:gs>
+            <a:gs pos="50000">
+              <a:schemeClr val="phClr">
+                <a:lumMod val="105000"/>
+                <a:satMod val="103000"/>
+                <a:tint val="73000"/>
+              </a:schemeClr>
+            </a:gs>
+            <a:gs pos="100000">
+              <a:schemeClr val="phClr">
+                <a:lumMod val="105000"/>
+                <a:satMod val="109000"/>
+                <a:tint val="81000"/>
+              </a:schemeClr>
+            </a:gs>
+          </a:gsLst>
+          <a:lin ang="5400000" scaled="0"/>
+        </a:gradFill>
+        <a:gradFill rotWithShape="1">
+          <a:gsLst>
+            <a:gs pos="0">
+              <a:schemeClr val="phClr">
+                <a:satMod val="103000"/>
+                <a:lumMod val="102000"/>
+                <a:tint val="94000"/>
+              </a:schemeClr>
+            </a:gs>
+            <a:gs pos="50000">
+              <a:schemeClr val="phClr">
+                <a:satMod val="110000"/>
+                <a:lumMod val="100000"/>
+                <a:shade val="100000"/>
+              </a:schemeClr>
+            </a:gs>
+            <a:gs pos="100000">
+              <a:schemeClr val="phClr">
+                <a:lumMod val="99000"/>
+                <a:satMod val="120000"/>
+                <a:shade val="78000"/>
+              </a:schemeClr>
+            </a:gs>
+          </a:gsLst>
+          <a:lin ang="5400000" scaled="0"/>
+        </a:gradFill>
+      </a:fillStyleLst>
+      <a:lnStyleLst>
+        <a:ln w="12700" cap="flat" cmpd="sng" algn="ctr">
+          <a:solidFill>
+            <a:schemeClr val="phClr"/>
+          </a:solidFill>
+          <a:prstDash val="solid"/>
+          <a:miter lim="800000"/>
+        </a:ln>
+        <a:ln w="19050" cap="flat" cmpd="sng" algn="ctr">
+          <a:solidFill>
+            <a:schemeClr val="phClr"/>
+          </a:solidFill>
+          <a:prstDash val="solid"/>
+          <a:miter lim="800000"/>
+        </a:ln>
+        <a:ln w="25400" cap="flat" cmpd="sng" algn="ctr">
+          <a:solidFill>
+            <a:schemeClr val="phClr"/>
+          </a:solidFill>
+          <a:prstDash val="solid"/>
+          <a:miter lim="800000"/>
+        </a:ln>
+      </a:lnStyleLst>
+      <a:effectStyleLst>
+        <a:effectStyle>
+          <a:effectLst/>
+        </a:effectStyle>
+        <a:effectStyle>
+          <a:effectLst/>
+        </a:effectStyle>
+        <a:effectStyle>
+          <a:effectLst>
+            <a:outerShdw blurRad="57150" dist="19050" dir="5400000" algn="ctr" rotWithShape="0">
+              <a:srgbClr val="000000">
+                <a:alpha val="63000"/>
+              </a:srgbClr>
+            </a:outerShdw>
+          </a:effectLst>
+        </a:effectStyle>
+      </a:effectStyleLst>
+      <a:bgFillStyleLst>
+        <a:solidFill>
+          <a:schemeClr val="phClr"/>
+        </a:solidFill>
+        <a:solidFill>
+          <a:schemeClr val="phClr">
+            <a:tint val="95000"/>
+            <a:satMod val="170000"/>
+          </a:schemeClr>
+        </a:solidFill>
+        <a:gradFill rotWithShape="1">
+          <a:gsLst>
+            <a:gs pos="0">
+              <a:schemeClr val="phClr">
+                <a:tint val="93000"/>
+                <a:satMod val="150000"/>
+                <a:shade val="98000"/>
+                <a:lumMod val="102000"/>
+              </a:schemeClr>
+            </a:gs>
+            <a:gs pos="50000">
+              <a:schemeClr val="phClr">
+                <a:tint val="98000"/>
+                <a:satMod val="130000"/>
+                <a:shade val="90000"/>
+                <a:lumMod val="103000"/>
+              </a:schemeClr>
+            </a:gs>
+            <a:gs pos="100000">
+              <a:schemeClr val="phClr">
+                <a:shade val="63000"/>
+                <a:satMod val="120000"/>
+              </a:schemeClr>
+            </a:gs>
+          </a:gsLst>
+          <a:lin ang="5400000" scaled="0"/>
+        </a:gradFill>
+      </a:bgFillStyleLst>
+    </a:fmtScheme>
+  </a:themeElements>
+  <a:objectDefaults>
+    <a:lnDef>
+      <a:spPr/>
+      <a:bodyPr/>
+      <a:lstStyle/>
+      <a:style>
+        <a:lnRef idx="2">
+          <a:schemeClr val="accent1"/>
+        </a:lnRef>
+        <a:fillRef idx="0">
+          <a:schemeClr val="accent1"/>
+        </a:fillRef>
+        <a:effectRef idx="1">
+          <a:schemeClr val="accent1"/>
+        </a:effectRef>
+        <a:fontRef idx="minor">
+          <a:schemeClr val="tx1"/>
+        </a:fontRef>
+      </a:style>
+    </a:lnDef>
+  </a:objectDefaults>
+  <a:extraClrSchemeLst/>
+  <a:extLst>
+    <a:ext uri="{05A4C25C-085E-4340-85A3-A5531E510DB2}">
+      <thm15:themeFamily xmlns:thm15="http://schemas.microsoft.com/office/thememl/2012/main" name="Office Theme" id="{2E142A2C-CD16-42D6-873A-C26D2A0506FA}" vid="{1BDDFF52-6CD6-40A5-AB3C-68EB2F1E4D0A}"/>
+    </a:ext>
+  </a:extLst>
+</a:theme>
 </file>
</xml_diff>

<commit_message>
Work on protocol description
</commit_message>
<xml_diff>
--- a/introdemo/Illustrations/Illustrations (Introduction to LabBench).pptx
+++ b/introdemo/Illustrations/Illustrations (Introduction to LabBench).pptx
@@ -5,7 +5,7 @@
     <p:sldMasterId id="2147483648" r:id="rId1"/>
   </p:sldMasterIdLst>
   <p:notesMasterIdLst>
-    <p:notesMasterId r:id="rId8"/>
+    <p:notesMasterId r:id="rId15"/>
   </p:notesMasterIdLst>
   <p:sldIdLst>
     <p:sldId id="256" r:id="rId2"/>
@@ -14,6 +14,13 @@
     <p:sldId id="259" r:id="rId5"/>
     <p:sldId id="260" r:id="rId6"/>
     <p:sldId id="257" r:id="rId7"/>
+    <p:sldId id="262" r:id="rId8"/>
+    <p:sldId id="263" r:id="rId9"/>
+    <p:sldId id="264" r:id="rId10"/>
+    <p:sldId id="265" r:id="rId11"/>
+    <p:sldId id="266" r:id="rId12"/>
+    <p:sldId id="267" r:id="rId13"/>
+    <p:sldId id="268" r:id="rId14"/>
   </p:sldIdLst>
   <p:sldSz cx="12192000" cy="6858000"/>
   <p:notesSz cx="6858000" cy="9144000"/>
@@ -202,7 +209,7 @@
           <a:p>
             <a:fld id="{2D646BAE-8E37-4DBA-A74E-0A3DD4A9F90C}" type="datetimeFigureOut">
               <a:rPr lang="en-DK" smtClean="0"/>
-              <a:t>26/12/2024</a:t>
+              <a:t>29/12/2024</a:t>
             </a:fld>
             <a:endParaRPr lang="en-DK"/>
           </a:p>
@@ -707,7 +714,7 @@
           <a:p>
             <a:fld id="{D4C52B10-47AD-4490-8483-919970C343B2}" type="datetimeFigureOut">
               <a:rPr lang="en-DK" smtClean="0"/>
-              <a:t>26/12/2024</a:t>
+              <a:t>29/12/2024</a:t>
             </a:fld>
             <a:endParaRPr lang="en-DK"/>
           </a:p>
@@ -907,7 +914,7 @@
           <a:p>
             <a:fld id="{D4C52B10-47AD-4490-8483-919970C343B2}" type="datetimeFigureOut">
               <a:rPr lang="en-DK" smtClean="0"/>
-              <a:t>26/12/2024</a:t>
+              <a:t>29/12/2024</a:t>
             </a:fld>
             <a:endParaRPr lang="en-DK"/>
           </a:p>
@@ -1117,7 +1124,7 @@
           <a:p>
             <a:fld id="{D4C52B10-47AD-4490-8483-919970C343B2}" type="datetimeFigureOut">
               <a:rPr lang="en-DK" smtClean="0"/>
-              <a:t>26/12/2024</a:t>
+              <a:t>29/12/2024</a:t>
             </a:fld>
             <a:endParaRPr lang="en-DK"/>
           </a:p>
@@ -1317,7 +1324,7 @@
           <a:p>
             <a:fld id="{D4C52B10-47AD-4490-8483-919970C343B2}" type="datetimeFigureOut">
               <a:rPr lang="en-DK" smtClean="0"/>
-              <a:t>26/12/2024</a:t>
+              <a:t>29/12/2024</a:t>
             </a:fld>
             <a:endParaRPr lang="en-DK"/>
           </a:p>
@@ -1593,7 +1600,7 @@
           <a:p>
             <a:fld id="{D4C52B10-47AD-4490-8483-919970C343B2}" type="datetimeFigureOut">
               <a:rPr lang="en-DK" smtClean="0"/>
-              <a:t>26/12/2024</a:t>
+              <a:t>29/12/2024</a:t>
             </a:fld>
             <a:endParaRPr lang="en-DK"/>
           </a:p>
@@ -1861,7 +1868,7 @@
           <a:p>
             <a:fld id="{D4C52B10-47AD-4490-8483-919970C343B2}" type="datetimeFigureOut">
               <a:rPr lang="en-DK" smtClean="0"/>
-              <a:t>26/12/2024</a:t>
+              <a:t>29/12/2024</a:t>
             </a:fld>
             <a:endParaRPr lang="en-DK"/>
           </a:p>
@@ -2276,7 +2283,7 @@
           <a:p>
             <a:fld id="{D4C52B10-47AD-4490-8483-919970C343B2}" type="datetimeFigureOut">
               <a:rPr lang="en-DK" smtClean="0"/>
-              <a:t>26/12/2024</a:t>
+              <a:t>29/12/2024</a:t>
             </a:fld>
             <a:endParaRPr lang="en-DK"/>
           </a:p>
@@ -2418,7 +2425,7 @@
           <a:p>
             <a:fld id="{D4C52B10-47AD-4490-8483-919970C343B2}" type="datetimeFigureOut">
               <a:rPr lang="en-DK" smtClean="0"/>
-              <a:t>26/12/2024</a:t>
+              <a:t>29/12/2024</a:t>
             </a:fld>
             <a:endParaRPr lang="en-DK"/>
           </a:p>
@@ -2531,7 +2538,7 @@
           <a:p>
             <a:fld id="{D4C52B10-47AD-4490-8483-919970C343B2}" type="datetimeFigureOut">
               <a:rPr lang="en-DK" smtClean="0"/>
-              <a:t>26/12/2024</a:t>
+              <a:t>29/12/2024</a:t>
             </a:fld>
             <a:endParaRPr lang="en-DK"/>
           </a:p>
@@ -2844,7 +2851,7 @@
           <a:p>
             <a:fld id="{D4C52B10-47AD-4490-8483-919970C343B2}" type="datetimeFigureOut">
               <a:rPr lang="en-DK" smtClean="0"/>
-              <a:t>26/12/2024</a:t>
+              <a:t>29/12/2024</a:t>
             </a:fld>
             <a:endParaRPr lang="en-DK"/>
           </a:p>
@@ -3133,7 +3140,7 @@
           <a:p>
             <a:fld id="{D4C52B10-47AD-4490-8483-919970C343B2}" type="datetimeFigureOut">
               <a:rPr lang="en-DK" smtClean="0"/>
-              <a:t>26/12/2024</a:t>
+              <a:t>29/12/2024</a:t>
             </a:fld>
             <a:endParaRPr lang="en-DK"/>
           </a:p>
@@ -3376,7 +3383,7 @@
           <a:p>
             <a:fld id="{D4C52B10-47AD-4490-8483-919970C343B2}" type="datetimeFigureOut">
               <a:rPr lang="en-DK" smtClean="0"/>
-              <a:t>26/12/2024</a:t>
+              <a:t>29/12/2024</a:t>
             </a:fld>
             <a:endParaRPr lang="en-DK"/>
           </a:p>
@@ -3864,6 +3871,1050 @@
 </p:sld>
 </file>
 
+<file path=ppt/slides/slide10.xml><?xml version="1.0" encoding="utf-8"?>
+<p:sld xmlns:a="http://schemas.openxmlformats.org/drawingml/2006/main" xmlns:r="http://schemas.openxmlformats.org/officeDocument/2006/relationships" xmlns:p="http://schemas.openxmlformats.org/presentationml/2006/main">
+  <p:cSld>
+    <p:spTree>
+      <p:nvGrpSpPr>
+        <p:cNvPr id="1" name=""/>
+        <p:cNvGrpSpPr/>
+        <p:nvPr/>
+      </p:nvGrpSpPr>
+      <p:grpSpPr>
+        <a:xfrm>
+          <a:off x="0" y="0"/>
+          <a:ext cx="0" cy="0"/>
+          <a:chOff x="0" y="0"/>
+          <a:chExt cx="0" cy="0"/>
+        </a:xfrm>
+      </p:grpSpPr>
+      <p:pic>
+        <p:nvPicPr>
+          <p:cNvPr id="3" name="Picture 2">
+            <a:extLst>
+              <a:ext uri="{FF2B5EF4-FFF2-40B4-BE49-F238E27FC236}">
+                <a16:creationId xmlns:a16="http://schemas.microsoft.com/office/drawing/2014/main" id="{2E31C314-7703-8F7F-5022-86C6323D1FE4}"/>
+              </a:ext>
+            </a:extLst>
+          </p:cNvPr>
+          <p:cNvPicPr>
+            <a:picLocks noChangeAspect="1"/>
+          </p:cNvPicPr>
+          <p:nvPr/>
+        </p:nvPicPr>
+        <p:blipFill>
+          <a:blip r:embed="rId2"/>
+          <a:stretch>
+            <a:fillRect/>
+          </a:stretch>
+        </p:blipFill>
+        <p:spPr>
+          <a:xfrm>
+            <a:off x="1334768" y="1464657"/>
+            <a:ext cx="5763262" cy="3118773"/>
+          </a:xfrm>
+          <a:prstGeom prst="rect">
+            <a:avLst/>
+          </a:prstGeom>
+        </p:spPr>
+      </p:pic>
+      <p:sp>
+        <p:nvSpPr>
+          <p:cNvPr id="4" name="TextBox 3">
+            <a:extLst>
+              <a:ext uri="{FF2B5EF4-FFF2-40B4-BE49-F238E27FC236}">
+                <a16:creationId xmlns:a16="http://schemas.microsoft.com/office/drawing/2014/main" id="{2A175505-041B-201C-613F-237C50E2A9C8}"/>
+              </a:ext>
+            </a:extLst>
+          </p:cNvPr>
+          <p:cNvSpPr txBox="1"/>
+          <p:nvPr/>
+        </p:nvSpPr>
+        <p:spPr>
+          <a:xfrm>
+            <a:off x="7453800" y="3557911"/>
+            <a:ext cx="2419509" cy="461665"/>
+          </a:xfrm>
+          <a:prstGeom prst="rect">
+            <a:avLst/>
+          </a:prstGeom>
+          <a:noFill/>
+        </p:spPr>
+        <p:txBody>
+          <a:bodyPr wrap="none" rtlCol="0">
+            <a:spAutoFit/>
+          </a:bodyPr>
+          <a:lstStyle/>
+          <a:p>
+            <a:r>
+              <a:rPr lang="en-GB" sz="2400" dirty="0"/>
+              <a:t>Configure device</a:t>
+            </a:r>
+            <a:endParaRPr lang="en-DK" sz="2400" dirty="0"/>
+          </a:p>
+        </p:txBody>
+      </p:sp>
+      <p:sp>
+        <p:nvSpPr>
+          <p:cNvPr id="5" name="Oval 4">
+            <a:extLst>
+              <a:ext uri="{FF2B5EF4-FFF2-40B4-BE49-F238E27FC236}">
+                <a16:creationId xmlns:a16="http://schemas.microsoft.com/office/drawing/2014/main" id="{307B86C2-11D4-A6CE-D2D9-69D04B75F1E5}"/>
+              </a:ext>
+            </a:extLst>
+          </p:cNvPr>
+          <p:cNvSpPr/>
+          <p:nvPr/>
+        </p:nvSpPr>
+        <p:spPr>
+          <a:xfrm>
+            <a:off x="6657990" y="3611309"/>
+            <a:ext cx="351060" cy="354870"/>
+          </a:xfrm>
+          <a:prstGeom prst="ellipse">
+            <a:avLst/>
+          </a:prstGeom>
+          <a:noFill/>
+          <a:ln w="38100">
+            <a:solidFill>
+              <a:srgbClr val="FF0000"/>
+            </a:solidFill>
+          </a:ln>
+        </p:spPr>
+        <p:style>
+          <a:lnRef idx="2">
+            <a:schemeClr val="accent1">
+              <a:shade val="15000"/>
+            </a:schemeClr>
+          </a:lnRef>
+          <a:fillRef idx="1">
+            <a:schemeClr val="accent1"/>
+          </a:fillRef>
+          <a:effectRef idx="0">
+            <a:schemeClr val="accent1"/>
+          </a:effectRef>
+          <a:fontRef idx="minor">
+            <a:schemeClr val="lt1"/>
+          </a:fontRef>
+        </p:style>
+        <p:txBody>
+          <a:bodyPr rtlCol="0" anchor="ctr"/>
+          <a:lstStyle/>
+          <a:p>
+            <a:pPr algn="ctr"/>
+            <a:endParaRPr lang="en-DK"/>
+          </a:p>
+        </p:txBody>
+      </p:sp>
+      <p:sp>
+        <p:nvSpPr>
+          <p:cNvPr id="6" name="Oval 5">
+            <a:extLst>
+              <a:ext uri="{FF2B5EF4-FFF2-40B4-BE49-F238E27FC236}">
+                <a16:creationId xmlns:a16="http://schemas.microsoft.com/office/drawing/2014/main" id="{A83AEC08-60A6-AF8A-C100-2E49C7988282}"/>
+              </a:ext>
+            </a:extLst>
+          </p:cNvPr>
+          <p:cNvSpPr/>
+          <p:nvPr/>
+        </p:nvSpPr>
+        <p:spPr>
+          <a:xfrm>
+            <a:off x="6658260" y="1691100"/>
+            <a:ext cx="351060" cy="354870"/>
+          </a:xfrm>
+          <a:prstGeom prst="ellipse">
+            <a:avLst/>
+          </a:prstGeom>
+          <a:noFill/>
+          <a:ln w="38100">
+            <a:solidFill>
+              <a:srgbClr val="FF0000"/>
+            </a:solidFill>
+          </a:ln>
+        </p:spPr>
+        <p:style>
+          <a:lnRef idx="2">
+            <a:schemeClr val="accent1">
+              <a:shade val="15000"/>
+            </a:schemeClr>
+          </a:lnRef>
+          <a:fillRef idx="1">
+            <a:schemeClr val="accent1"/>
+          </a:fillRef>
+          <a:effectRef idx="0">
+            <a:schemeClr val="accent1"/>
+          </a:effectRef>
+          <a:fontRef idx="minor">
+            <a:schemeClr val="lt1"/>
+          </a:fontRef>
+        </p:style>
+        <p:txBody>
+          <a:bodyPr rtlCol="0" anchor="ctr"/>
+          <a:lstStyle/>
+          <a:p>
+            <a:pPr algn="ctr"/>
+            <a:endParaRPr lang="en-DK"/>
+          </a:p>
+        </p:txBody>
+      </p:sp>
+      <p:cxnSp>
+        <p:nvCxnSpPr>
+          <p:cNvPr id="7" name="Straight Arrow Connector 6">
+            <a:extLst>
+              <a:ext uri="{FF2B5EF4-FFF2-40B4-BE49-F238E27FC236}">
+                <a16:creationId xmlns:a16="http://schemas.microsoft.com/office/drawing/2014/main" id="{25C02E09-5313-B447-7AB3-E0D9025358C1}"/>
+              </a:ext>
+            </a:extLst>
+          </p:cNvPr>
+          <p:cNvCxnSpPr>
+            <a:cxnSpLocks/>
+            <a:stCxn id="4" idx="1"/>
+            <a:endCxn id="5" idx="6"/>
+          </p:cNvCxnSpPr>
+          <p:nvPr/>
+        </p:nvCxnSpPr>
+        <p:spPr>
+          <a:xfrm flipH="1">
+            <a:off x="7009050" y="3788744"/>
+            <a:ext cx="444750" cy="0"/>
+          </a:xfrm>
+          <a:prstGeom prst="straightConnector1">
+            <a:avLst/>
+          </a:prstGeom>
+          <a:ln w="38100">
+            <a:solidFill>
+              <a:schemeClr val="tx1"/>
+            </a:solidFill>
+            <a:tailEnd type="triangle"/>
+          </a:ln>
+        </p:spPr>
+        <p:style>
+          <a:lnRef idx="2">
+            <a:schemeClr val="accent1"/>
+          </a:lnRef>
+          <a:fillRef idx="0">
+            <a:schemeClr val="accent1"/>
+          </a:fillRef>
+          <a:effectRef idx="1">
+            <a:schemeClr val="accent1"/>
+          </a:effectRef>
+          <a:fontRef idx="minor">
+            <a:schemeClr val="tx1"/>
+          </a:fontRef>
+        </p:style>
+      </p:cxnSp>
+      <p:sp>
+        <p:nvSpPr>
+          <p:cNvPr id="13" name="TextBox 12">
+            <a:extLst>
+              <a:ext uri="{FF2B5EF4-FFF2-40B4-BE49-F238E27FC236}">
+                <a16:creationId xmlns:a16="http://schemas.microsoft.com/office/drawing/2014/main" id="{DE39DAA0-A2B3-6618-7476-7EB5A322BCE9}"/>
+              </a:ext>
+            </a:extLst>
+          </p:cNvPr>
+          <p:cNvSpPr txBox="1"/>
+          <p:nvPr/>
+        </p:nvSpPr>
+        <p:spPr>
+          <a:xfrm>
+            <a:off x="7537620" y="1641455"/>
+            <a:ext cx="2570960" cy="461665"/>
+          </a:xfrm>
+          <a:prstGeom prst="rect">
+            <a:avLst/>
+          </a:prstGeom>
+          <a:noFill/>
+        </p:spPr>
+        <p:txBody>
+          <a:bodyPr wrap="none" rtlCol="0">
+            <a:spAutoFit/>
+          </a:bodyPr>
+          <a:lstStyle/>
+          <a:p>
+            <a:r>
+              <a:rPr lang="en-GB" sz="2400" dirty="0"/>
+              <a:t>Assign equipment</a:t>
+            </a:r>
+            <a:endParaRPr lang="en-DK" sz="2400" dirty="0"/>
+          </a:p>
+        </p:txBody>
+      </p:sp>
+      <p:cxnSp>
+        <p:nvCxnSpPr>
+          <p:cNvPr id="14" name="Straight Arrow Connector 13">
+            <a:extLst>
+              <a:ext uri="{FF2B5EF4-FFF2-40B4-BE49-F238E27FC236}">
+                <a16:creationId xmlns:a16="http://schemas.microsoft.com/office/drawing/2014/main" id="{BB0C41DD-1E5D-6990-1765-C0DD379CA639}"/>
+              </a:ext>
+            </a:extLst>
+          </p:cNvPr>
+          <p:cNvCxnSpPr>
+            <a:cxnSpLocks/>
+            <a:stCxn id="13" idx="1"/>
+            <a:endCxn id="6" idx="6"/>
+          </p:cNvCxnSpPr>
+          <p:nvPr/>
+        </p:nvCxnSpPr>
+        <p:spPr>
+          <a:xfrm flipH="1" flipV="1">
+            <a:off x="7009320" y="1868535"/>
+            <a:ext cx="528300" cy="3753"/>
+          </a:xfrm>
+          <a:prstGeom prst="straightConnector1">
+            <a:avLst/>
+          </a:prstGeom>
+          <a:ln w="38100">
+            <a:solidFill>
+              <a:schemeClr val="tx1"/>
+            </a:solidFill>
+            <a:tailEnd type="triangle"/>
+          </a:ln>
+        </p:spPr>
+        <p:style>
+          <a:lnRef idx="2">
+            <a:schemeClr val="accent1"/>
+          </a:lnRef>
+          <a:fillRef idx="0">
+            <a:schemeClr val="accent1"/>
+          </a:fillRef>
+          <a:effectRef idx="1">
+            <a:schemeClr val="accent1"/>
+          </a:effectRef>
+          <a:fontRef idx="minor">
+            <a:schemeClr val="tx1"/>
+          </a:fontRef>
+        </p:style>
+      </p:cxnSp>
+    </p:spTree>
+    <p:extLst>
+      <p:ext uri="{BB962C8B-B14F-4D97-AF65-F5344CB8AC3E}">
+        <p14:creationId xmlns:p14="http://schemas.microsoft.com/office/powerpoint/2010/main" val="3644246962"/>
+      </p:ext>
+    </p:extLst>
+  </p:cSld>
+  <p:clrMapOvr>
+    <a:masterClrMapping/>
+  </p:clrMapOvr>
+</p:sld>
+</file>
+
+<file path=ppt/slides/slide11.xml><?xml version="1.0" encoding="utf-8"?>
+<p:sld xmlns:a="http://schemas.openxmlformats.org/drawingml/2006/main" xmlns:r="http://schemas.openxmlformats.org/officeDocument/2006/relationships" xmlns:p="http://schemas.openxmlformats.org/presentationml/2006/main">
+  <p:cSld>
+    <p:spTree>
+      <p:nvGrpSpPr>
+        <p:cNvPr id="1" name=""/>
+        <p:cNvGrpSpPr/>
+        <p:nvPr/>
+      </p:nvGrpSpPr>
+      <p:grpSpPr>
+        <a:xfrm>
+          <a:off x="0" y="0"/>
+          <a:ext cx="0" cy="0"/>
+          <a:chOff x="0" y="0"/>
+          <a:chExt cx="0" cy="0"/>
+        </a:xfrm>
+      </p:grpSpPr>
+      <p:pic>
+        <p:nvPicPr>
+          <p:cNvPr id="3" name="Picture 2">
+            <a:extLst>
+              <a:ext uri="{FF2B5EF4-FFF2-40B4-BE49-F238E27FC236}">
+                <a16:creationId xmlns:a16="http://schemas.microsoft.com/office/drawing/2014/main" id="{691BB2D8-84FE-6E87-8A80-12647BA7CBBC}"/>
+              </a:ext>
+            </a:extLst>
+          </p:cNvPr>
+          <p:cNvPicPr>
+            <a:picLocks noChangeAspect="1"/>
+          </p:cNvPicPr>
+          <p:nvPr/>
+        </p:nvPicPr>
+        <p:blipFill>
+          <a:blip r:embed="rId2"/>
+          <a:stretch>
+            <a:fillRect/>
+          </a:stretch>
+        </p:blipFill>
+        <p:spPr>
+          <a:xfrm>
+            <a:off x="4093527" y="1522731"/>
+            <a:ext cx="2547303" cy="2541974"/>
+          </a:xfrm>
+          <a:prstGeom prst="rect">
+            <a:avLst/>
+          </a:prstGeom>
+        </p:spPr>
+      </p:pic>
+      <p:sp>
+        <p:nvSpPr>
+          <p:cNvPr id="4" name="Rectangle 3">
+            <a:extLst>
+              <a:ext uri="{FF2B5EF4-FFF2-40B4-BE49-F238E27FC236}">
+                <a16:creationId xmlns:a16="http://schemas.microsoft.com/office/drawing/2014/main" id="{DC20FDEC-E354-2BDF-662A-66F8CDEE441C}"/>
+              </a:ext>
+            </a:extLst>
+          </p:cNvPr>
+          <p:cNvSpPr/>
+          <p:nvPr/>
+        </p:nvSpPr>
+        <p:spPr>
+          <a:xfrm>
+            <a:off x="5367178" y="1936636"/>
+            <a:ext cx="1170782" cy="292214"/>
+          </a:xfrm>
+          <a:prstGeom prst="rect">
+            <a:avLst/>
+          </a:prstGeom>
+          <a:noFill/>
+          <a:ln w="28575">
+            <a:solidFill>
+              <a:srgbClr val="FF0000"/>
+            </a:solidFill>
+          </a:ln>
+        </p:spPr>
+        <p:style>
+          <a:lnRef idx="2">
+            <a:schemeClr val="accent1">
+              <a:shade val="15000"/>
+            </a:schemeClr>
+          </a:lnRef>
+          <a:fillRef idx="1">
+            <a:schemeClr val="accent1"/>
+          </a:fillRef>
+          <a:effectRef idx="0">
+            <a:schemeClr val="accent1"/>
+          </a:effectRef>
+          <a:fontRef idx="minor">
+            <a:schemeClr val="lt1"/>
+          </a:fontRef>
+        </p:style>
+        <p:txBody>
+          <a:bodyPr rtlCol="0" anchor="ctr"/>
+          <a:lstStyle/>
+          <a:p>
+            <a:pPr algn="ctr"/>
+            <a:endParaRPr lang="en-DK"/>
+          </a:p>
+        </p:txBody>
+      </p:sp>
+      <p:sp>
+        <p:nvSpPr>
+          <p:cNvPr id="5" name="Rectangle 4">
+            <a:extLst>
+              <a:ext uri="{FF2B5EF4-FFF2-40B4-BE49-F238E27FC236}">
+                <a16:creationId xmlns:a16="http://schemas.microsoft.com/office/drawing/2014/main" id="{9B6E8131-8462-87F3-EC06-3A772901755D}"/>
+              </a:ext>
+            </a:extLst>
+          </p:cNvPr>
+          <p:cNvSpPr/>
+          <p:nvPr/>
+        </p:nvSpPr>
+        <p:spPr>
+          <a:xfrm>
+            <a:off x="4099242" y="1936636"/>
+            <a:ext cx="427038" cy="292214"/>
+          </a:xfrm>
+          <a:prstGeom prst="rect">
+            <a:avLst/>
+          </a:prstGeom>
+          <a:noFill/>
+          <a:ln w="28575">
+            <a:solidFill>
+              <a:srgbClr val="FF0000"/>
+            </a:solidFill>
+          </a:ln>
+        </p:spPr>
+        <p:style>
+          <a:lnRef idx="2">
+            <a:schemeClr val="accent1">
+              <a:shade val="15000"/>
+            </a:schemeClr>
+          </a:lnRef>
+          <a:fillRef idx="1">
+            <a:schemeClr val="accent1"/>
+          </a:fillRef>
+          <a:effectRef idx="0">
+            <a:schemeClr val="accent1"/>
+          </a:effectRef>
+          <a:fontRef idx="minor">
+            <a:schemeClr val="lt1"/>
+          </a:fontRef>
+        </p:style>
+        <p:txBody>
+          <a:bodyPr rtlCol="0" anchor="ctr"/>
+          <a:lstStyle/>
+          <a:p>
+            <a:pPr algn="ctr"/>
+            <a:endParaRPr lang="en-DK"/>
+          </a:p>
+        </p:txBody>
+      </p:sp>
+      <p:sp>
+        <p:nvSpPr>
+          <p:cNvPr id="6" name="TextBox 5">
+            <a:extLst>
+              <a:ext uri="{FF2B5EF4-FFF2-40B4-BE49-F238E27FC236}">
+                <a16:creationId xmlns:a16="http://schemas.microsoft.com/office/drawing/2014/main" id="{B37007C0-B68D-B5E5-5ADC-51A5DA63671E}"/>
+              </a:ext>
+            </a:extLst>
+          </p:cNvPr>
+          <p:cNvSpPr txBox="1"/>
+          <p:nvPr/>
+        </p:nvSpPr>
+        <p:spPr>
+          <a:xfrm>
+            <a:off x="1680210" y="896389"/>
+            <a:ext cx="4213398" cy="461665"/>
+          </a:xfrm>
+          <a:prstGeom prst="rect">
+            <a:avLst/>
+          </a:prstGeom>
+          <a:noFill/>
+        </p:spPr>
+        <p:txBody>
+          <a:bodyPr wrap="none" rtlCol="0">
+            <a:spAutoFit/>
+          </a:bodyPr>
+          <a:lstStyle/>
+          <a:p>
+            <a:r>
+              <a:rPr lang="en-GB" sz="2400" dirty="0"/>
+              <a:t>ID of the device in the protocol</a:t>
+            </a:r>
+            <a:endParaRPr lang="en-DK" sz="2400" dirty="0"/>
+          </a:p>
+        </p:txBody>
+      </p:sp>
+      <p:cxnSp>
+        <p:nvCxnSpPr>
+          <p:cNvPr id="7" name="Connector: Elbow 6">
+            <a:extLst>
+              <a:ext uri="{FF2B5EF4-FFF2-40B4-BE49-F238E27FC236}">
+                <a16:creationId xmlns:a16="http://schemas.microsoft.com/office/drawing/2014/main" id="{EFFC6550-D237-CCDD-087C-DE63218F8157}"/>
+              </a:ext>
+            </a:extLst>
+          </p:cNvPr>
+          <p:cNvCxnSpPr>
+            <a:cxnSpLocks/>
+            <a:stCxn id="6" idx="2"/>
+            <a:endCxn id="5" idx="1"/>
+          </p:cNvCxnSpPr>
+          <p:nvPr/>
+        </p:nvCxnSpPr>
+        <p:spPr>
+          <a:xfrm rot="16200000" flipH="1">
+            <a:off x="3580731" y="1564231"/>
+            <a:ext cx="724689" cy="312333"/>
+          </a:xfrm>
+          <a:prstGeom prst="bentConnector2">
+            <a:avLst/>
+          </a:prstGeom>
+          <a:ln w="38100">
+            <a:solidFill>
+              <a:schemeClr val="tx1"/>
+            </a:solidFill>
+            <a:tailEnd type="triangle"/>
+          </a:ln>
+        </p:spPr>
+        <p:style>
+          <a:lnRef idx="2">
+            <a:schemeClr val="accent1"/>
+          </a:lnRef>
+          <a:fillRef idx="0">
+            <a:schemeClr val="accent1"/>
+          </a:fillRef>
+          <a:effectRef idx="1">
+            <a:schemeClr val="accent1"/>
+          </a:effectRef>
+          <a:fontRef idx="minor">
+            <a:schemeClr val="tx1"/>
+          </a:fontRef>
+        </p:style>
+      </p:cxnSp>
+      <p:sp>
+        <p:nvSpPr>
+          <p:cNvPr id="8" name="TextBox 7">
+            <a:extLst>
+              <a:ext uri="{FF2B5EF4-FFF2-40B4-BE49-F238E27FC236}">
+                <a16:creationId xmlns:a16="http://schemas.microsoft.com/office/drawing/2014/main" id="{8C7E1EA3-6BFB-9BEA-2B4C-6B8811D04B5F}"/>
+              </a:ext>
+            </a:extLst>
+          </p:cNvPr>
+          <p:cNvSpPr txBox="1"/>
+          <p:nvPr/>
+        </p:nvSpPr>
+        <p:spPr>
+          <a:xfrm>
+            <a:off x="4781391" y="4290135"/>
+            <a:ext cx="5000536" cy="461665"/>
+          </a:xfrm>
+          <a:prstGeom prst="rect">
+            <a:avLst/>
+          </a:prstGeom>
+          <a:noFill/>
+        </p:spPr>
+        <p:txBody>
+          <a:bodyPr wrap="none" rtlCol="0">
+            <a:spAutoFit/>
+          </a:bodyPr>
+          <a:lstStyle/>
+          <a:p>
+            <a:r>
+              <a:rPr lang="en-GB" sz="2400" dirty="0"/>
+              <a:t>Equipment ID from the Devices Page</a:t>
+            </a:r>
+            <a:endParaRPr lang="en-DK" sz="2400" dirty="0"/>
+          </a:p>
+        </p:txBody>
+      </p:sp>
+      <p:cxnSp>
+        <p:nvCxnSpPr>
+          <p:cNvPr id="11" name="Connector: Elbow 10">
+            <a:extLst>
+              <a:ext uri="{FF2B5EF4-FFF2-40B4-BE49-F238E27FC236}">
+                <a16:creationId xmlns:a16="http://schemas.microsoft.com/office/drawing/2014/main" id="{01933161-5E71-E645-16A3-F34138C34FC9}"/>
+              </a:ext>
+            </a:extLst>
+          </p:cNvPr>
+          <p:cNvCxnSpPr>
+            <a:cxnSpLocks/>
+            <a:stCxn id="8" idx="0"/>
+            <a:endCxn id="4" idx="3"/>
+          </p:cNvCxnSpPr>
+          <p:nvPr/>
+        </p:nvCxnSpPr>
+        <p:spPr>
+          <a:xfrm rot="16200000" flipV="1">
+            <a:off x="5806114" y="2814589"/>
+            <a:ext cx="2207392" cy="743699"/>
+          </a:xfrm>
+          <a:prstGeom prst="bentConnector2">
+            <a:avLst/>
+          </a:prstGeom>
+          <a:ln w="38100">
+            <a:solidFill>
+              <a:schemeClr val="tx1"/>
+            </a:solidFill>
+            <a:tailEnd type="triangle"/>
+          </a:ln>
+        </p:spPr>
+        <p:style>
+          <a:lnRef idx="2">
+            <a:schemeClr val="accent1"/>
+          </a:lnRef>
+          <a:fillRef idx="0">
+            <a:schemeClr val="accent1"/>
+          </a:fillRef>
+          <a:effectRef idx="1">
+            <a:schemeClr val="accent1"/>
+          </a:effectRef>
+          <a:fontRef idx="minor">
+            <a:schemeClr val="tx1"/>
+          </a:fontRef>
+        </p:style>
+      </p:cxnSp>
+    </p:spTree>
+    <p:extLst>
+      <p:ext uri="{BB962C8B-B14F-4D97-AF65-F5344CB8AC3E}">
+        <p14:creationId xmlns:p14="http://schemas.microsoft.com/office/powerpoint/2010/main" val="3537912471"/>
+      </p:ext>
+    </p:extLst>
+  </p:cSld>
+  <p:clrMapOvr>
+    <a:masterClrMapping/>
+  </p:clrMapOvr>
+</p:sld>
+</file>
+
+<file path=ppt/slides/slide12.xml><?xml version="1.0" encoding="utf-8"?>
+<p:sld xmlns:a="http://schemas.openxmlformats.org/drawingml/2006/main" xmlns:r="http://schemas.openxmlformats.org/officeDocument/2006/relationships" xmlns:p="http://schemas.openxmlformats.org/presentationml/2006/main">
+  <p:cSld>
+    <p:spTree>
+      <p:nvGrpSpPr>
+        <p:cNvPr id="1" name=""/>
+        <p:cNvGrpSpPr/>
+        <p:nvPr/>
+      </p:nvGrpSpPr>
+      <p:grpSpPr>
+        <a:xfrm>
+          <a:off x="0" y="0"/>
+          <a:ext cx="0" cy="0"/>
+          <a:chOff x="0" y="0"/>
+          <a:chExt cx="0" cy="0"/>
+        </a:xfrm>
+      </p:grpSpPr>
+      <p:pic>
+        <p:nvPicPr>
+          <p:cNvPr id="3" name="Picture 2">
+            <a:extLst>
+              <a:ext uri="{FF2B5EF4-FFF2-40B4-BE49-F238E27FC236}">
+                <a16:creationId xmlns:a16="http://schemas.microsoft.com/office/drawing/2014/main" id="{C7F841DC-1AE7-F7BA-2D01-9B08D3173643}"/>
+              </a:ext>
+            </a:extLst>
+          </p:cNvPr>
+          <p:cNvPicPr>
+            <a:picLocks noChangeAspect="1"/>
+          </p:cNvPicPr>
+          <p:nvPr/>
+        </p:nvPicPr>
+        <p:blipFill>
+          <a:blip r:embed="rId2"/>
+          <a:stretch>
+            <a:fillRect/>
+          </a:stretch>
+        </p:blipFill>
+        <p:spPr>
+          <a:xfrm>
+            <a:off x="4260229" y="807316"/>
+            <a:ext cx="3671542" cy="4164734"/>
+          </a:xfrm>
+          <a:prstGeom prst="rect">
+            <a:avLst/>
+          </a:prstGeom>
+        </p:spPr>
+      </p:pic>
+    </p:spTree>
+    <p:extLst>
+      <p:ext uri="{BB962C8B-B14F-4D97-AF65-F5344CB8AC3E}">
+        <p14:creationId xmlns:p14="http://schemas.microsoft.com/office/powerpoint/2010/main" val="4292007652"/>
+      </p:ext>
+    </p:extLst>
+  </p:cSld>
+  <p:clrMapOvr>
+    <a:masterClrMapping/>
+  </p:clrMapOvr>
+</p:sld>
+</file>
+
+<file path=ppt/slides/slide13.xml><?xml version="1.0" encoding="utf-8"?>
+<p:sld xmlns:a="http://schemas.openxmlformats.org/drawingml/2006/main" xmlns:r="http://schemas.openxmlformats.org/officeDocument/2006/relationships" xmlns:p="http://schemas.openxmlformats.org/presentationml/2006/main">
+  <p:cSld>
+    <p:spTree>
+      <p:nvGrpSpPr>
+        <p:cNvPr id="1" name=""/>
+        <p:cNvGrpSpPr/>
+        <p:nvPr/>
+      </p:nvGrpSpPr>
+      <p:grpSpPr>
+        <a:xfrm>
+          <a:off x="0" y="0"/>
+          <a:ext cx="0" cy="0"/>
+          <a:chOff x="0" y="0"/>
+          <a:chExt cx="0" cy="0"/>
+        </a:xfrm>
+      </p:grpSpPr>
+      <p:pic>
+        <p:nvPicPr>
+          <p:cNvPr id="3" name="Picture 2">
+            <a:extLst>
+              <a:ext uri="{FF2B5EF4-FFF2-40B4-BE49-F238E27FC236}">
+                <a16:creationId xmlns:a16="http://schemas.microsoft.com/office/drawing/2014/main" id="{966D044B-7E3C-43AA-FEC1-3B52CA969CEC}"/>
+              </a:ext>
+            </a:extLst>
+          </p:cNvPr>
+          <p:cNvPicPr>
+            <a:picLocks noChangeAspect="1"/>
+          </p:cNvPicPr>
+          <p:nvPr/>
+        </p:nvPicPr>
+        <p:blipFill>
+          <a:blip r:embed="rId2"/>
+          <a:stretch>
+            <a:fillRect/>
+          </a:stretch>
+        </p:blipFill>
+        <p:spPr>
+          <a:xfrm>
+            <a:off x="1754925" y="2342991"/>
+            <a:ext cx="4845279" cy="1451769"/>
+          </a:xfrm>
+          <a:prstGeom prst="rect">
+            <a:avLst/>
+          </a:prstGeom>
+        </p:spPr>
+      </p:pic>
+      <p:sp>
+        <p:nvSpPr>
+          <p:cNvPr id="4" name="TextBox 3">
+            <a:extLst>
+              <a:ext uri="{FF2B5EF4-FFF2-40B4-BE49-F238E27FC236}">
+                <a16:creationId xmlns:a16="http://schemas.microsoft.com/office/drawing/2014/main" id="{AA69CAF4-EE98-743B-C099-760CF178B5A3}"/>
+              </a:ext>
+            </a:extLst>
+          </p:cNvPr>
+          <p:cNvSpPr txBox="1"/>
+          <p:nvPr/>
+        </p:nvSpPr>
+        <p:spPr>
+          <a:xfrm>
+            <a:off x="4253044" y="3989039"/>
+            <a:ext cx="3403432" cy="461665"/>
+          </a:xfrm>
+          <a:prstGeom prst="rect">
+            <a:avLst/>
+          </a:prstGeom>
+          <a:noFill/>
+        </p:spPr>
+        <p:txBody>
+          <a:bodyPr wrap="none" rtlCol="0">
+            <a:spAutoFit/>
+          </a:bodyPr>
+          <a:lstStyle/>
+          <a:p>
+            <a:r>
+              <a:rPr lang="en-GB" sz="2400" dirty="0"/>
+              <a:t>Change output directory</a:t>
+            </a:r>
+            <a:endParaRPr lang="en-DK" sz="2400" dirty="0"/>
+          </a:p>
+        </p:txBody>
+      </p:sp>
+      <p:sp>
+        <p:nvSpPr>
+          <p:cNvPr id="5" name="Oval 4">
+            <a:extLst>
+              <a:ext uri="{FF2B5EF4-FFF2-40B4-BE49-F238E27FC236}">
+                <a16:creationId xmlns:a16="http://schemas.microsoft.com/office/drawing/2014/main" id="{95308CBF-75AC-4533-ADA5-1C5902738426}"/>
+              </a:ext>
+            </a:extLst>
+          </p:cNvPr>
+          <p:cNvSpPr/>
+          <p:nvPr/>
+        </p:nvSpPr>
+        <p:spPr>
+          <a:xfrm>
+            <a:off x="5779230" y="3119850"/>
+            <a:ext cx="351060" cy="354870"/>
+          </a:xfrm>
+          <a:prstGeom prst="ellipse">
+            <a:avLst/>
+          </a:prstGeom>
+          <a:noFill/>
+          <a:ln w="38100">
+            <a:solidFill>
+              <a:srgbClr val="FF0000"/>
+            </a:solidFill>
+          </a:ln>
+        </p:spPr>
+        <p:style>
+          <a:lnRef idx="2">
+            <a:schemeClr val="accent1">
+              <a:shade val="15000"/>
+            </a:schemeClr>
+          </a:lnRef>
+          <a:fillRef idx="1">
+            <a:schemeClr val="accent1"/>
+          </a:fillRef>
+          <a:effectRef idx="0">
+            <a:schemeClr val="accent1"/>
+          </a:effectRef>
+          <a:fontRef idx="minor">
+            <a:schemeClr val="lt1"/>
+          </a:fontRef>
+        </p:style>
+        <p:txBody>
+          <a:bodyPr rtlCol="0" anchor="ctr"/>
+          <a:lstStyle/>
+          <a:p>
+            <a:pPr algn="ctr"/>
+            <a:endParaRPr lang="en-DK"/>
+          </a:p>
+        </p:txBody>
+      </p:sp>
+      <p:cxnSp>
+        <p:nvCxnSpPr>
+          <p:cNvPr id="6" name="Straight Arrow Connector 5">
+            <a:extLst>
+              <a:ext uri="{FF2B5EF4-FFF2-40B4-BE49-F238E27FC236}">
+                <a16:creationId xmlns:a16="http://schemas.microsoft.com/office/drawing/2014/main" id="{11EE31CC-CDB9-9C1F-865A-9092D08036D7}"/>
+              </a:ext>
+            </a:extLst>
+          </p:cNvPr>
+          <p:cNvCxnSpPr>
+            <a:cxnSpLocks/>
+            <a:stCxn id="8" idx="2"/>
+            <a:endCxn id="7" idx="0"/>
+          </p:cNvCxnSpPr>
+          <p:nvPr/>
+        </p:nvCxnSpPr>
+        <p:spPr>
+          <a:xfrm>
+            <a:off x="5584650" y="2148712"/>
+            <a:ext cx="0" cy="971138"/>
+          </a:xfrm>
+          <a:prstGeom prst="straightConnector1">
+            <a:avLst/>
+          </a:prstGeom>
+          <a:ln w="38100">
+            <a:solidFill>
+              <a:schemeClr val="tx1"/>
+            </a:solidFill>
+            <a:tailEnd type="triangle"/>
+          </a:ln>
+        </p:spPr>
+        <p:style>
+          <a:lnRef idx="2">
+            <a:schemeClr val="accent1"/>
+          </a:lnRef>
+          <a:fillRef idx="0">
+            <a:schemeClr val="accent1"/>
+          </a:fillRef>
+          <a:effectRef idx="1">
+            <a:schemeClr val="accent1"/>
+          </a:effectRef>
+          <a:fontRef idx="minor">
+            <a:schemeClr val="tx1"/>
+          </a:fontRef>
+        </p:style>
+      </p:cxnSp>
+      <p:sp>
+        <p:nvSpPr>
+          <p:cNvPr id="7" name="Oval 6">
+            <a:extLst>
+              <a:ext uri="{FF2B5EF4-FFF2-40B4-BE49-F238E27FC236}">
+                <a16:creationId xmlns:a16="http://schemas.microsoft.com/office/drawing/2014/main" id="{038BA0A9-2727-E9A1-E9E7-13C243939F61}"/>
+              </a:ext>
+            </a:extLst>
+          </p:cNvPr>
+          <p:cNvSpPr/>
+          <p:nvPr/>
+        </p:nvSpPr>
+        <p:spPr>
+          <a:xfrm>
+            <a:off x="5409120" y="3119850"/>
+            <a:ext cx="351060" cy="354870"/>
+          </a:xfrm>
+          <a:prstGeom prst="ellipse">
+            <a:avLst/>
+          </a:prstGeom>
+          <a:noFill/>
+          <a:ln w="38100">
+            <a:solidFill>
+              <a:srgbClr val="FF0000"/>
+            </a:solidFill>
+          </a:ln>
+        </p:spPr>
+        <p:style>
+          <a:lnRef idx="2">
+            <a:schemeClr val="accent1">
+              <a:shade val="15000"/>
+            </a:schemeClr>
+          </a:lnRef>
+          <a:fillRef idx="1">
+            <a:schemeClr val="accent1"/>
+          </a:fillRef>
+          <a:effectRef idx="0">
+            <a:schemeClr val="accent1"/>
+          </a:effectRef>
+          <a:fontRef idx="minor">
+            <a:schemeClr val="lt1"/>
+          </a:fontRef>
+        </p:style>
+        <p:txBody>
+          <a:bodyPr rtlCol="0" anchor="ctr"/>
+          <a:lstStyle/>
+          <a:p>
+            <a:pPr algn="ctr"/>
+            <a:endParaRPr lang="en-DK"/>
+          </a:p>
+        </p:txBody>
+      </p:sp>
+      <p:sp>
+        <p:nvSpPr>
+          <p:cNvPr id="8" name="TextBox 7">
+            <a:extLst>
+              <a:ext uri="{FF2B5EF4-FFF2-40B4-BE49-F238E27FC236}">
+                <a16:creationId xmlns:a16="http://schemas.microsoft.com/office/drawing/2014/main" id="{5F3D90DD-3F0D-0A00-95E1-D2417F4B7F30}"/>
+              </a:ext>
+            </a:extLst>
+          </p:cNvPr>
+          <p:cNvSpPr txBox="1"/>
+          <p:nvPr/>
+        </p:nvSpPr>
+        <p:spPr>
+          <a:xfrm>
+            <a:off x="4645931" y="1687047"/>
+            <a:ext cx="1877437" cy="461665"/>
+          </a:xfrm>
+          <a:prstGeom prst="rect">
+            <a:avLst/>
+          </a:prstGeom>
+          <a:noFill/>
+        </p:spPr>
+        <p:txBody>
+          <a:bodyPr wrap="none" rtlCol="0">
+            <a:spAutoFit/>
+          </a:bodyPr>
+          <a:lstStyle/>
+          <a:p>
+            <a:r>
+              <a:rPr lang="en-GB" sz="2400" dirty="0"/>
+              <a:t>Rerun action</a:t>
+            </a:r>
+            <a:endParaRPr lang="en-DK" sz="2400" dirty="0"/>
+          </a:p>
+        </p:txBody>
+      </p:sp>
+      <p:cxnSp>
+        <p:nvCxnSpPr>
+          <p:cNvPr id="9" name="Straight Arrow Connector 8">
+            <a:extLst>
+              <a:ext uri="{FF2B5EF4-FFF2-40B4-BE49-F238E27FC236}">
+                <a16:creationId xmlns:a16="http://schemas.microsoft.com/office/drawing/2014/main" id="{24348D09-1613-C877-2E1C-69B830551984}"/>
+              </a:ext>
+            </a:extLst>
+          </p:cNvPr>
+          <p:cNvCxnSpPr>
+            <a:cxnSpLocks/>
+            <a:stCxn id="4" idx="0"/>
+            <a:endCxn id="5" idx="4"/>
+          </p:cNvCxnSpPr>
+          <p:nvPr/>
+        </p:nvCxnSpPr>
+        <p:spPr>
+          <a:xfrm flipV="1">
+            <a:off x="5954760" y="3474720"/>
+            <a:ext cx="0" cy="514319"/>
+          </a:xfrm>
+          <a:prstGeom prst="straightConnector1">
+            <a:avLst/>
+          </a:prstGeom>
+          <a:ln w="38100">
+            <a:solidFill>
+              <a:schemeClr val="tx1"/>
+            </a:solidFill>
+            <a:tailEnd type="triangle"/>
+          </a:ln>
+        </p:spPr>
+        <p:style>
+          <a:lnRef idx="2">
+            <a:schemeClr val="accent1"/>
+          </a:lnRef>
+          <a:fillRef idx="0">
+            <a:schemeClr val="accent1"/>
+          </a:fillRef>
+          <a:effectRef idx="1">
+            <a:schemeClr val="accent1"/>
+          </a:effectRef>
+          <a:fontRef idx="minor">
+            <a:schemeClr val="tx1"/>
+          </a:fontRef>
+        </p:style>
+      </p:cxnSp>
+    </p:spTree>
+    <p:extLst>
+      <p:ext uri="{BB962C8B-B14F-4D97-AF65-F5344CB8AC3E}">
+        <p14:creationId xmlns:p14="http://schemas.microsoft.com/office/powerpoint/2010/main" val="3476744341"/>
+      </p:ext>
+    </p:extLst>
+  </p:cSld>
+  <p:clrMapOvr>
+    <a:masterClrMapping/>
+  </p:clrMapOvr>
+</p:sld>
+</file>
+
 <file path=ppt/slides/slide2.xml><?xml version="1.0" encoding="utf-8"?>
 <p:sld xmlns:a="http://schemas.openxmlformats.org/drawingml/2006/main" xmlns:r="http://schemas.openxmlformats.org/officeDocument/2006/relationships" xmlns:p="http://schemas.openxmlformats.org/presentationml/2006/main">
   <p:cSld>
@@ -4811,8 +5862,2071 @@
         </p:blipFill>
         <p:spPr>
           <a:xfrm>
-            <a:off x="2478194" y="1796147"/>
+            <a:off x="2488354" y="1801227"/>
             <a:ext cx="7200000" cy="3249635"/>
+          </a:xfrm>
+          <a:prstGeom prst="rect">
+            <a:avLst/>
+          </a:prstGeom>
+        </p:spPr>
+      </p:pic>
+      <p:sp>
+        <p:nvSpPr>
+          <p:cNvPr id="2" name="TextBox 1">
+            <a:extLst>
+              <a:ext uri="{FF2B5EF4-FFF2-40B4-BE49-F238E27FC236}">
+                <a16:creationId xmlns:a16="http://schemas.microsoft.com/office/drawing/2014/main" id="{6677FA99-0C13-9DE5-5A67-9AB4806EC1D7}"/>
+              </a:ext>
+            </a:extLst>
+          </p:cNvPr>
+          <p:cNvSpPr txBox="1"/>
+          <p:nvPr/>
+        </p:nvSpPr>
+        <p:spPr>
+          <a:xfrm>
+            <a:off x="7151820" y="1154429"/>
+            <a:ext cx="4617546" cy="461665"/>
+          </a:xfrm>
+          <a:prstGeom prst="rect">
+            <a:avLst/>
+          </a:prstGeom>
+          <a:noFill/>
+        </p:spPr>
+        <p:txBody>
+          <a:bodyPr wrap="none" rtlCol="0">
+            <a:spAutoFit/>
+          </a:bodyPr>
+          <a:lstStyle/>
+          <a:p>
+            <a:r>
+              <a:rPr lang="en-GB" sz="2400" dirty="0"/>
+              <a:t>Click the “Install protocol” button</a:t>
+            </a:r>
+            <a:endParaRPr lang="en-DK" sz="2400" dirty="0"/>
+          </a:p>
+        </p:txBody>
+      </p:sp>
+      <p:sp>
+        <p:nvSpPr>
+          <p:cNvPr id="4" name="Oval 3">
+            <a:extLst>
+              <a:ext uri="{FF2B5EF4-FFF2-40B4-BE49-F238E27FC236}">
+                <a16:creationId xmlns:a16="http://schemas.microsoft.com/office/drawing/2014/main" id="{1DC4B956-6C96-8B5F-4195-D0FD1B8DF5B8}"/>
+              </a:ext>
+            </a:extLst>
+          </p:cNvPr>
+          <p:cNvSpPr/>
+          <p:nvPr/>
+        </p:nvSpPr>
+        <p:spPr>
+          <a:xfrm>
+            <a:off x="9346465" y="2144376"/>
+            <a:ext cx="252000" cy="252000"/>
+          </a:xfrm>
+          <a:prstGeom prst="ellipse">
+            <a:avLst/>
+          </a:prstGeom>
+          <a:noFill/>
+          <a:ln w="28575">
+            <a:solidFill>
+              <a:srgbClr val="FF0000"/>
+            </a:solidFill>
+          </a:ln>
+        </p:spPr>
+        <p:style>
+          <a:lnRef idx="2">
+            <a:schemeClr val="accent1">
+              <a:shade val="15000"/>
+            </a:schemeClr>
+          </a:lnRef>
+          <a:fillRef idx="1">
+            <a:schemeClr val="accent1"/>
+          </a:fillRef>
+          <a:effectRef idx="0">
+            <a:schemeClr val="accent1"/>
+          </a:effectRef>
+          <a:fontRef idx="minor">
+            <a:schemeClr val="lt1"/>
+          </a:fontRef>
+        </p:style>
+        <p:txBody>
+          <a:bodyPr rtlCol="0" anchor="ctr"/>
+          <a:lstStyle/>
+          <a:p>
+            <a:pPr algn="ctr"/>
+            <a:endParaRPr lang="en-DK"/>
+          </a:p>
+        </p:txBody>
+      </p:sp>
+      <p:cxnSp>
+        <p:nvCxnSpPr>
+          <p:cNvPr id="5" name="Straight Arrow Connector 4">
+            <a:extLst>
+              <a:ext uri="{FF2B5EF4-FFF2-40B4-BE49-F238E27FC236}">
+                <a16:creationId xmlns:a16="http://schemas.microsoft.com/office/drawing/2014/main" id="{93E64279-4F6F-8D88-372A-DC5ED4486621}"/>
+              </a:ext>
+            </a:extLst>
+          </p:cNvPr>
+          <p:cNvCxnSpPr>
+            <a:cxnSpLocks/>
+            <a:stCxn id="2" idx="2"/>
+            <a:endCxn id="4" idx="0"/>
+          </p:cNvCxnSpPr>
+          <p:nvPr/>
+        </p:nvCxnSpPr>
+        <p:spPr>
+          <a:xfrm>
+            <a:off x="9460593" y="1616094"/>
+            <a:ext cx="11872" cy="528282"/>
+          </a:xfrm>
+          <a:prstGeom prst="straightConnector1">
+            <a:avLst/>
+          </a:prstGeom>
+          <a:ln w="38100">
+            <a:solidFill>
+              <a:schemeClr val="tx1"/>
+            </a:solidFill>
+            <a:tailEnd type="triangle"/>
+          </a:ln>
+        </p:spPr>
+        <p:style>
+          <a:lnRef idx="2">
+            <a:schemeClr val="accent1"/>
+          </a:lnRef>
+          <a:fillRef idx="0">
+            <a:schemeClr val="accent1"/>
+          </a:fillRef>
+          <a:effectRef idx="1">
+            <a:schemeClr val="accent1"/>
+          </a:effectRef>
+          <a:fontRef idx="minor">
+            <a:schemeClr val="tx1"/>
+          </a:fontRef>
+        </p:style>
+      </p:cxnSp>
+      <p:sp>
+        <p:nvSpPr>
+          <p:cNvPr id="6" name="TextBox 5">
+            <a:extLst>
+              <a:ext uri="{FF2B5EF4-FFF2-40B4-BE49-F238E27FC236}">
+                <a16:creationId xmlns:a16="http://schemas.microsoft.com/office/drawing/2014/main" id="{F76A0597-FD8A-F512-3A91-EE00B602208C}"/>
+              </a:ext>
+            </a:extLst>
+          </p:cNvPr>
+          <p:cNvSpPr txBox="1"/>
+          <p:nvPr/>
+        </p:nvSpPr>
+        <p:spPr>
+          <a:xfrm>
+            <a:off x="262890" y="1154429"/>
+            <a:ext cx="3560847" cy="461665"/>
+          </a:xfrm>
+          <a:prstGeom prst="rect">
+            <a:avLst/>
+          </a:prstGeom>
+          <a:noFill/>
+        </p:spPr>
+        <p:txBody>
+          <a:bodyPr wrap="none" rtlCol="0">
+            <a:spAutoFit/>
+          </a:bodyPr>
+          <a:lstStyle/>
+          <a:p>
+            <a:r>
+              <a:rPr lang="en-GB" sz="2400" dirty="0"/>
+              <a:t>Select the Protocols page</a:t>
+            </a:r>
+            <a:endParaRPr lang="en-DK" sz="2400" dirty="0"/>
+          </a:p>
+        </p:txBody>
+      </p:sp>
+      <p:sp>
+        <p:nvSpPr>
+          <p:cNvPr id="7" name="Rectangle 6">
+            <a:extLst>
+              <a:ext uri="{FF2B5EF4-FFF2-40B4-BE49-F238E27FC236}">
+                <a16:creationId xmlns:a16="http://schemas.microsoft.com/office/drawing/2014/main" id="{06B6924F-C6A3-DE95-814F-1E6083FCF9AD}"/>
+              </a:ext>
+            </a:extLst>
+          </p:cNvPr>
+          <p:cNvSpPr/>
+          <p:nvPr/>
+        </p:nvSpPr>
+        <p:spPr>
+          <a:xfrm>
+            <a:off x="2496000" y="3055492"/>
+            <a:ext cx="592640" cy="561468"/>
+          </a:xfrm>
+          <a:prstGeom prst="rect">
+            <a:avLst/>
+          </a:prstGeom>
+          <a:noFill/>
+          <a:ln w="28575">
+            <a:solidFill>
+              <a:srgbClr val="FF0000"/>
+            </a:solidFill>
+          </a:ln>
+        </p:spPr>
+        <p:style>
+          <a:lnRef idx="2">
+            <a:schemeClr val="accent1">
+              <a:shade val="15000"/>
+            </a:schemeClr>
+          </a:lnRef>
+          <a:fillRef idx="1">
+            <a:schemeClr val="accent1"/>
+          </a:fillRef>
+          <a:effectRef idx="0">
+            <a:schemeClr val="accent1"/>
+          </a:effectRef>
+          <a:fontRef idx="minor">
+            <a:schemeClr val="lt1"/>
+          </a:fontRef>
+        </p:style>
+        <p:txBody>
+          <a:bodyPr rtlCol="0" anchor="ctr"/>
+          <a:lstStyle/>
+          <a:p>
+            <a:pPr algn="ctr"/>
+            <a:endParaRPr lang="en-DK"/>
+          </a:p>
+        </p:txBody>
+      </p:sp>
+      <p:cxnSp>
+        <p:nvCxnSpPr>
+          <p:cNvPr id="8" name="Connector: Elbow 7">
+            <a:extLst>
+              <a:ext uri="{FF2B5EF4-FFF2-40B4-BE49-F238E27FC236}">
+                <a16:creationId xmlns:a16="http://schemas.microsoft.com/office/drawing/2014/main" id="{8714B5E4-9805-1AB1-CDD2-B8EDE472EF7B}"/>
+              </a:ext>
+            </a:extLst>
+          </p:cNvPr>
+          <p:cNvCxnSpPr>
+            <a:stCxn id="6" idx="2"/>
+            <a:endCxn id="7" idx="1"/>
+          </p:cNvCxnSpPr>
+          <p:nvPr/>
+        </p:nvCxnSpPr>
+        <p:spPr>
+          <a:xfrm rot="16200000" flipH="1">
+            <a:off x="1409591" y="2249817"/>
+            <a:ext cx="1720132" cy="452686"/>
+          </a:xfrm>
+          <a:prstGeom prst="bentConnector2">
+            <a:avLst/>
+          </a:prstGeom>
+          <a:ln w="38100">
+            <a:solidFill>
+              <a:schemeClr val="tx1"/>
+            </a:solidFill>
+            <a:tailEnd type="triangle"/>
+          </a:ln>
+        </p:spPr>
+        <p:style>
+          <a:lnRef idx="2">
+            <a:schemeClr val="accent1"/>
+          </a:lnRef>
+          <a:fillRef idx="0">
+            <a:schemeClr val="accent1"/>
+          </a:fillRef>
+          <a:effectRef idx="1">
+            <a:schemeClr val="accent1"/>
+          </a:effectRef>
+          <a:fontRef idx="minor">
+            <a:schemeClr val="tx1"/>
+          </a:fontRef>
+        </p:style>
+      </p:cxnSp>
+      <p:sp>
+        <p:nvSpPr>
+          <p:cNvPr id="9" name="TextBox 8">
+            <a:extLst>
+              <a:ext uri="{FF2B5EF4-FFF2-40B4-BE49-F238E27FC236}">
+                <a16:creationId xmlns:a16="http://schemas.microsoft.com/office/drawing/2014/main" id="{1BDB8B3B-96EE-D52F-0A38-B95A10631AA7}"/>
+              </a:ext>
+            </a:extLst>
+          </p:cNvPr>
+          <p:cNvSpPr txBox="1"/>
+          <p:nvPr/>
+        </p:nvSpPr>
+        <p:spPr>
+          <a:xfrm>
+            <a:off x="1440628" y="5324148"/>
+            <a:ext cx="4569456" cy="461665"/>
+          </a:xfrm>
+          <a:prstGeom prst="rect">
+            <a:avLst/>
+          </a:prstGeom>
+          <a:noFill/>
+        </p:spPr>
+        <p:txBody>
+          <a:bodyPr wrap="none" rtlCol="0">
+            <a:spAutoFit/>
+          </a:bodyPr>
+          <a:lstStyle/>
+          <a:p>
+            <a:r>
+              <a:rPr lang="en-GB" sz="2400" dirty="0"/>
+              <a:t>Select the labbench.io repository</a:t>
+            </a:r>
+            <a:endParaRPr lang="en-DK" sz="2400" dirty="0"/>
+          </a:p>
+        </p:txBody>
+      </p:sp>
+      <p:sp>
+        <p:nvSpPr>
+          <p:cNvPr id="10" name="Rectangle 9">
+            <a:extLst>
+              <a:ext uri="{FF2B5EF4-FFF2-40B4-BE49-F238E27FC236}">
+                <a16:creationId xmlns:a16="http://schemas.microsoft.com/office/drawing/2014/main" id="{6817383C-5401-4FA9-9F50-435DF7DEB2D3}"/>
+              </a:ext>
+            </a:extLst>
+          </p:cNvPr>
+          <p:cNvSpPr/>
+          <p:nvPr/>
+        </p:nvSpPr>
+        <p:spPr>
+          <a:xfrm>
+            <a:off x="3096286" y="2447176"/>
+            <a:ext cx="1304264" cy="364604"/>
+          </a:xfrm>
+          <a:prstGeom prst="rect">
+            <a:avLst/>
+          </a:prstGeom>
+          <a:noFill/>
+          <a:ln w="28575">
+            <a:solidFill>
+              <a:srgbClr val="FF0000"/>
+            </a:solidFill>
+          </a:ln>
+        </p:spPr>
+        <p:style>
+          <a:lnRef idx="2">
+            <a:schemeClr val="accent1">
+              <a:shade val="15000"/>
+            </a:schemeClr>
+          </a:lnRef>
+          <a:fillRef idx="1">
+            <a:schemeClr val="accent1"/>
+          </a:fillRef>
+          <a:effectRef idx="0">
+            <a:schemeClr val="accent1"/>
+          </a:effectRef>
+          <a:fontRef idx="minor">
+            <a:schemeClr val="lt1"/>
+          </a:fontRef>
+        </p:style>
+        <p:txBody>
+          <a:bodyPr rtlCol="0" anchor="ctr"/>
+          <a:lstStyle/>
+          <a:p>
+            <a:pPr algn="ctr"/>
+            <a:endParaRPr lang="en-DK"/>
+          </a:p>
+        </p:txBody>
+      </p:sp>
+      <p:cxnSp>
+        <p:nvCxnSpPr>
+          <p:cNvPr id="11" name="Straight Arrow Connector 10">
+            <a:extLst>
+              <a:ext uri="{FF2B5EF4-FFF2-40B4-BE49-F238E27FC236}">
+                <a16:creationId xmlns:a16="http://schemas.microsoft.com/office/drawing/2014/main" id="{87C4BC75-E149-F74E-D0E8-5596CE4CD0FB}"/>
+              </a:ext>
+            </a:extLst>
+          </p:cNvPr>
+          <p:cNvCxnSpPr>
+            <a:cxnSpLocks/>
+            <a:stCxn id="9" idx="0"/>
+            <a:endCxn id="10" idx="2"/>
+          </p:cNvCxnSpPr>
+          <p:nvPr/>
+        </p:nvCxnSpPr>
+        <p:spPr>
+          <a:xfrm flipV="1">
+            <a:off x="3725356" y="2811780"/>
+            <a:ext cx="23062" cy="2512368"/>
+          </a:xfrm>
+          <a:prstGeom prst="straightConnector1">
+            <a:avLst/>
+          </a:prstGeom>
+          <a:ln w="38100">
+            <a:solidFill>
+              <a:schemeClr val="tx1"/>
+            </a:solidFill>
+            <a:tailEnd type="triangle"/>
+          </a:ln>
+        </p:spPr>
+        <p:style>
+          <a:lnRef idx="2">
+            <a:schemeClr val="accent1"/>
+          </a:lnRef>
+          <a:fillRef idx="0">
+            <a:schemeClr val="accent1"/>
+          </a:fillRef>
+          <a:effectRef idx="1">
+            <a:schemeClr val="accent1"/>
+          </a:effectRef>
+          <a:fontRef idx="minor">
+            <a:schemeClr val="tx1"/>
+          </a:fontRef>
+        </p:style>
+      </p:cxnSp>
+      <p:sp>
+        <p:nvSpPr>
+          <p:cNvPr id="14" name="Rectangle 13">
+            <a:extLst>
+              <a:ext uri="{FF2B5EF4-FFF2-40B4-BE49-F238E27FC236}">
+                <a16:creationId xmlns:a16="http://schemas.microsoft.com/office/drawing/2014/main" id="{E66900B7-B313-359B-B99E-F96AF9B23241}"/>
+              </a:ext>
+            </a:extLst>
+          </p:cNvPr>
+          <p:cNvSpPr/>
+          <p:nvPr/>
+        </p:nvSpPr>
+        <p:spPr>
+          <a:xfrm>
+            <a:off x="4487770" y="2462416"/>
+            <a:ext cx="1545376" cy="486524"/>
+          </a:xfrm>
+          <a:prstGeom prst="rect">
+            <a:avLst/>
+          </a:prstGeom>
+          <a:noFill/>
+          <a:ln w="28575">
+            <a:solidFill>
+              <a:srgbClr val="FF0000"/>
+            </a:solidFill>
+          </a:ln>
+        </p:spPr>
+        <p:style>
+          <a:lnRef idx="2">
+            <a:schemeClr val="accent1">
+              <a:shade val="15000"/>
+            </a:schemeClr>
+          </a:lnRef>
+          <a:fillRef idx="1">
+            <a:schemeClr val="accent1"/>
+          </a:fillRef>
+          <a:effectRef idx="0">
+            <a:schemeClr val="accent1"/>
+          </a:effectRef>
+          <a:fontRef idx="minor">
+            <a:schemeClr val="lt1"/>
+          </a:fontRef>
+        </p:style>
+        <p:txBody>
+          <a:bodyPr rtlCol="0" anchor="ctr"/>
+          <a:lstStyle/>
+          <a:p>
+            <a:pPr algn="ctr"/>
+            <a:endParaRPr lang="en-DK"/>
+          </a:p>
+        </p:txBody>
+      </p:sp>
+      <p:sp>
+        <p:nvSpPr>
+          <p:cNvPr id="15" name="TextBox 14">
+            <a:extLst>
+              <a:ext uri="{FF2B5EF4-FFF2-40B4-BE49-F238E27FC236}">
+                <a16:creationId xmlns:a16="http://schemas.microsoft.com/office/drawing/2014/main" id="{924305A6-1AB4-8177-647B-C1EA4453EEE9}"/>
+              </a:ext>
+            </a:extLst>
+          </p:cNvPr>
+          <p:cNvSpPr txBox="1"/>
+          <p:nvPr/>
+        </p:nvSpPr>
+        <p:spPr>
+          <a:xfrm>
+            <a:off x="3029879" y="510462"/>
+            <a:ext cx="4461158" cy="461665"/>
+          </a:xfrm>
+          <a:prstGeom prst="rect">
+            <a:avLst/>
+          </a:prstGeom>
+          <a:noFill/>
+        </p:spPr>
+        <p:txBody>
+          <a:bodyPr wrap="none" rtlCol="0">
+            <a:spAutoFit/>
+          </a:bodyPr>
+          <a:lstStyle/>
+          <a:p>
+            <a:r>
+              <a:rPr lang="en-GB" sz="2400" dirty="0"/>
+              <a:t>Select Introduction to LabBench</a:t>
+            </a:r>
+            <a:endParaRPr lang="en-DK" sz="2400" dirty="0"/>
+          </a:p>
+        </p:txBody>
+      </p:sp>
+      <p:cxnSp>
+        <p:nvCxnSpPr>
+          <p:cNvPr id="16" name="Straight Arrow Connector 15">
+            <a:extLst>
+              <a:ext uri="{FF2B5EF4-FFF2-40B4-BE49-F238E27FC236}">
+                <a16:creationId xmlns:a16="http://schemas.microsoft.com/office/drawing/2014/main" id="{31090E74-C18F-6FB4-4238-FC8793294D2D}"/>
+              </a:ext>
+            </a:extLst>
+          </p:cNvPr>
+          <p:cNvCxnSpPr>
+            <a:cxnSpLocks/>
+            <a:stCxn id="15" idx="2"/>
+            <a:endCxn id="14" idx="0"/>
+          </p:cNvCxnSpPr>
+          <p:nvPr/>
+        </p:nvCxnSpPr>
+        <p:spPr>
+          <a:xfrm>
+            <a:off x="5260458" y="972127"/>
+            <a:ext cx="0" cy="1490289"/>
+          </a:xfrm>
+          <a:prstGeom prst="straightConnector1">
+            <a:avLst/>
+          </a:prstGeom>
+          <a:ln w="38100">
+            <a:solidFill>
+              <a:schemeClr val="tx1"/>
+            </a:solidFill>
+            <a:tailEnd type="triangle"/>
+          </a:ln>
+        </p:spPr>
+        <p:style>
+          <a:lnRef idx="2">
+            <a:schemeClr val="accent1"/>
+          </a:lnRef>
+          <a:fillRef idx="0">
+            <a:schemeClr val="accent1"/>
+          </a:fillRef>
+          <a:effectRef idx="1">
+            <a:schemeClr val="accent1"/>
+          </a:effectRef>
+          <a:fontRef idx="minor">
+            <a:schemeClr val="tx1"/>
+          </a:fontRef>
+        </p:style>
+      </p:cxnSp>
+    </p:spTree>
+    <p:extLst>
+      <p:ext uri="{BB962C8B-B14F-4D97-AF65-F5344CB8AC3E}">
+        <p14:creationId xmlns:p14="http://schemas.microsoft.com/office/powerpoint/2010/main" val="1165474774"/>
+      </p:ext>
+    </p:extLst>
+  </p:cSld>
+  <p:clrMapOvr>
+    <a:masterClrMapping/>
+  </p:clrMapOvr>
+</p:sld>
+</file>
+
+<file path=ppt/slides/slide7.xml><?xml version="1.0" encoding="utf-8"?>
+<p:sld xmlns:a="http://schemas.openxmlformats.org/drawingml/2006/main" xmlns:r="http://schemas.openxmlformats.org/officeDocument/2006/relationships" xmlns:p="http://schemas.openxmlformats.org/presentationml/2006/main">
+  <p:cSld>
+    <p:spTree>
+      <p:nvGrpSpPr>
+        <p:cNvPr id="1" name=""/>
+        <p:cNvGrpSpPr/>
+        <p:nvPr/>
+      </p:nvGrpSpPr>
+      <p:grpSpPr>
+        <a:xfrm>
+          <a:off x="0" y="0"/>
+          <a:ext cx="0" cy="0"/>
+          <a:chOff x="0" y="0"/>
+          <a:chExt cx="0" cy="0"/>
+        </a:xfrm>
+      </p:grpSpPr>
+      <p:pic>
+        <p:nvPicPr>
+          <p:cNvPr id="3" name="Picture 2">
+            <a:extLst>
+              <a:ext uri="{FF2B5EF4-FFF2-40B4-BE49-F238E27FC236}">
+                <a16:creationId xmlns:a16="http://schemas.microsoft.com/office/drawing/2014/main" id="{65A7B9E7-9DD2-B775-2F49-D48F10242CB5}"/>
+              </a:ext>
+            </a:extLst>
+          </p:cNvPr>
+          <p:cNvPicPr>
+            <a:picLocks noChangeAspect="1"/>
+          </p:cNvPicPr>
+          <p:nvPr/>
+        </p:nvPicPr>
+        <p:blipFill>
+          <a:blip r:embed="rId2"/>
+          <a:stretch>
+            <a:fillRect/>
+          </a:stretch>
+        </p:blipFill>
+        <p:spPr>
+          <a:xfrm>
+            <a:off x="1017068" y="1188086"/>
+            <a:ext cx="4572638" cy="3029373"/>
+          </a:xfrm>
+          <a:prstGeom prst="rect">
+            <a:avLst/>
+          </a:prstGeom>
+        </p:spPr>
+      </p:pic>
+      <p:sp>
+        <p:nvSpPr>
+          <p:cNvPr id="4" name="TextBox 3">
+            <a:extLst>
+              <a:ext uri="{FF2B5EF4-FFF2-40B4-BE49-F238E27FC236}">
+                <a16:creationId xmlns:a16="http://schemas.microsoft.com/office/drawing/2014/main" id="{48A845C3-F93A-5B59-2F5C-5F94E0007C62}"/>
+              </a:ext>
+            </a:extLst>
+          </p:cNvPr>
+          <p:cNvSpPr txBox="1"/>
+          <p:nvPr/>
+        </p:nvSpPr>
+        <p:spPr>
+          <a:xfrm>
+            <a:off x="5817870" y="1907155"/>
+            <a:ext cx="5574411" cy="461665"/>
+          </a:xfrm>
+          <a:prstGeom prst="rect">
+            <a:avLst/>
+          </a:prstGeom>
+          <a:noFill/>
+        </p:spPr>
+        <p:txBody>
+          <a:bodyPr wrap="none" rtlCol="0">
+            <a:spAutoFit/>
+          </a:bodyPr>
+          <a:lstStyle/>
+          <a:p>
+            <a:r>
+              <a:rPr lang="en-GB" sz="2400" dirty="0"/>
+              <a:t>ID of the experiment that must be unique</a:t>
+            </a:r>
+            <a:endParaRPr lang="en-DK" sz="2400" dirty="0"/>
+          </a:p>
+        </p:txBody>
+      </p:sp>
+      <p:sp>
+        <p:nvSpPr>
+          <p:cNvPr id="5" name="Rectangle 4">
+            <a:extLst>
+              <a:ext uri="{FF2B5EF4-FFF2-40B4-BE49-F238E27FC236}">
+                <a16:creationId xmlns:a16="http://schemas.microsoft.com/office/drawing/2014/main" id="{034337C5-BC39-1C80-37BE-C0E1A131FD86}"/>
+              </a:ext>
+            </a:extLst>
+          </p:cNvPr>
+          <p:cNvSpPr/>
+          <p:nvPr/>
+        </p:nvSpPr>
+        <p:spPr>
+          <a:xfrm>
+            <a:off x="1679402" y="1955686"/>
+            <a:ext cx="3795568" cy="364604"/>
+          </a:xfrm>
+          <a:prstGeom prst="rect">
+            <a:avLst/>
+          </a:prstGeom>
+          <a:noFill/>
+          <a:ln w="28575">
+            <a:solidFill>
+              <a:srgbClr val="FF0000"/>
+            </a:solidFill>
+          </a:ln>
+        </p:spPr>
+        <p:style>
+          <a:lnRef idx="2">
+            <a:schemeClr val="accent1">
+              <a:shade val="15000"/>
+            </a:schemeClr>
+          </a:lnRef>
+          <a:fillRef idx="1">
+            <a:schemeClr val="accent1"/>
+          </a:fillRef>
+          <a:effectRef idx="0">
+            <a:schemeClr val="accent1"/>
+          </a:effectRef>
+          <a:fontRef idx="minor">
+            <a:schemeClr val="lt1"/>
+          </a:fontRef>
+        </p:style>
+        <p:txBody>
+          <a:bodyPr rtlCol="0" anchor="ctr"/>
+          <a:lstStyle/>
+          <a:p>
+            <a:pPr algn="ctr"/>
+            <a:endParaRPr lang="en-DK"/>
+          </a:p>
+        </p:txBody>
+      </p:sp>
+      <p:cxnSp>
+        <p:nvCxnSpPr>
+          <p:cNvPr id="6" name="Straight Arrow Connector 5">
+            <a:extLst>
+              <a:ext uri="{FF2B5EF4-FFF2-40B4-BE49-F238E27FC236}">
+                <a16:creationId xmlns:a16="http://schemas.microsoft.com/office/drawing/2014/main" id="{59D1DC78-C598-3160-5728-D7CE12B13951}"/>
+              </a:ext>
+            </a:extLst>
+          </p:cNvPr>
+          <p:cNvCxnSpPr>
+            <a:cxnSpLocks/>
+          </p:cNvCxnSpPr>
+          <p:nvPr/>
+        </p:nvCxnSpPr>
+        <p:spPr>
+          <a:xfrm flipH="1">
+            <a:off x="5474970" y="2125980"/>
+            <a:ext cx="342900" cy="0"/>
+          </a:xfrm>
+          <a:prstGeom prst="straightConnector1">
+            <a:avLst/>
+          </a:prstGeom>
+          <a:ln w="38100">
+            <a:solidFill>
+              <a:schemeClr val="tx1"/>
+            </a:solidFill>
+            <a:tailEnd type="triangle"/>
+          </a:ln>
+        </p:spPr>
+        <p:style>
+          <a:lnRef idx="2">
+            <a:schemeClr val="accent1"/>
+          </a:lnRef>
+          <a:fillRef idx="0">
+            <a:schemeClr val="accent1"/>
+          </a:fillRef>
+          <a:effectRef idx="1">
+            <a:schemeClr val="accent1"/>
+          </a:effectRef>
+          <a:fontRef idx="minor">
+            <a:schemeClr val="tx1"/>
+          </a:fontRef>
+        </p:style>
+      </p:cxnSp>
+      <p:sp>
+        <p:nvSpPr>
+          <p:cNvPr id="8" name="Rectangle 7">
+            <a:extLst>
+              <a:ext uri="{FF2B5EF4-FFF2-40B4-BE49-F238E27FC236}">
+                <a16:creationId xmlns:a16="http://schemas.microsoft.com/office/drawing/2014/main" id="{01AD0939-0692-8BD0-3A1A-B3C68FE184A0}"/>
+              </a:ext>
+            </a:extLst>
+          </p:cNvPr>
+          <p:cNvSpPr/>
+          <p:nvPr/>
+        </p:nvSpPr>
+        <p:spPr>
+          <a:xfrm>
+            <a:off x="1679402" y="2384954"/>
+            <a:ext cx="3795568" cy="364604"/>
+          </a:xfrm>
+          <a:prstGeom prst="rect">
+            <a:avLst/>
+          </a:prstGeom>
+          <a:noFill/>
+          <a:ln w="28575">
+            <a:solidFill>
+              <a:srgbClr val="FF0000"/>
+            </a:solidFill>
+          </a:ln>
+        </p:spPr>
+        <p:style>
+          <a:lnRef idx="2">
+            <a:schemeClr val="accent1">
+              <a:shade val="15000"/>
+            </a:schemeClr>
+          </a:lnRef>
+          <a:fillRef idx="1">
+            <a:schemeClr val="accent1"/>
+          </a:fillRef>
+          <a:effectRef idx="0">
+            <a:schemeClr val="accent1"/>
+          </a:effectRef>
+          <a:fontRef idx="minor">
+            <a:schemeClr val="lt1"/>
+          </a:fontRef>
+        </p:style>
+        <p:txBody>
+          <a:bodyPr rtlCol="0" anchor="ctr"/>
+          <a:lstStyle/>
+          <a:p>
+            <a:pPr algn="ctr"/>
+            <a:endParaRPr lang="en-DK"/>
+          </a:p>
+        </p:txBody>
+      </p:sp>
+      <p:sp>
+        <p:nvSpPr>
+          <p:cNvPr id="9" name="Rectangle 8">
+            <a:extLst>
+              <a:ext uri="{FF2B5EF4-FFF2-40B4-BE49-F238E27FC236}">
+                <a16:creationId xmlns:a16="http://schemas.microsoft.com/office/drawing/2014/main" id="{8115D8F7-78F6-3A34-B208-CFDBCF12438C}"/>
+              </a:ext>
+            </a:extLst>
+          </p:cNvPr>
+          <p:cNvSpPr/>
+          <p:nvPr/>
+        </p:nvSpPr>
+        <p:spPr>
+          <a:xfrm>
+            <a:off x="1679402" y="2811386"/>
+            <a:ext cx="3795568" cy="364604"/>
+          </a:xfrm>
+          <a:prstGeom prst="rect">
+            <a:avLst/>
+          </a:prstGeom>
+          <a:noFill/>
+          <a:ln w="28575">
+            <a:solidFill>
+              <a:srgbClr val="FF0000"/>
+            </a:solidFill>
+          </a:ln>
+        </p:spPr>
+        <p:style>
+          <a:lnRef idx="2">
+            <a:schemeClr val="accent1">
+              <a:shade val="15000"/>
+            </a:schemeClr>
+          </a:lnRef>
+          <a:fillRef idx="1">
+            <a:schemeClr val="accent1"/>
+          </a:fillRef>
+          <a:effectRef idx="0">
+            <a:schemeClr val="accent1"/>
+          </a:effectRef>
+          <a:fontRef idx="minor">
+            <a:schemeClr val="lt1"/>
+          </a:fontRef>
+        </p:style>
+        <p:txBody>
+          <a:bodyPr rtlCol="0" anchor="ctr"/>
+          <a:lstStyle/>
+          <a:p>
+            <a:pPr algn="ctr"/>
+            <a:endParaRPr lang="en-DK"/>
+          </a:p>
+        </p:txBody>
+      </p:sp>
+      <p:sp>
+        <p:nvSpPr>
+          <p:cNvPr id="10" name="Rectangle 9">
+            <a:extLst>
+              <a:ext uri="{FF2B5EF4-FFF2-40B4-BE49-F238E27FC236}">
+                <a16:creationId xmlns:a16="http://schemas.microsoft.com/office/drawing/2014/main" id="{EB671691-7505-DF9D-8874-918A137C8066}"/>
+              </a:ext>
+            </a:extLst>
+          </p:cNvPr>
+          <p:cNvSpPr/>
+          <p:nvPr/>
+        </p:nvSpPr>
+        <p:spPr>
+          <a:xfrm>
+            <a:off x="1679402" y="3230381"/>
+            <a:ext cx="3795568" cy="364604"/>
+          </a:xfrm>
+          <a:prstGeom prst="rect">
+            <a:avLst/>
+          </a:prstGeom>
+          <a:noFill/>
+          <a:ln w="28575">
+            <a:solidFill>
+              <a:srgbClr val="FF0000"/>
+            </a:solidFill>
+          </a:ln>
+        </p:spPr>
+        <p:style>
+          <a:lnRef idx="2">
+            <a:schemeClr val="accent1">
+              <a:shade val="15000"/>
+            </a:schemeClr>
+          </a:lnRef>
+          <a:fillRef idx="1">
+            <a:schemeClr val="accent1"/>
+          </a:fillRef>
+          <a:effectRef idx="0">
+            <a:schemeClr val="accent1"/>
+          </a:effectRef>
+          <a:fontRef idx="minor">
+            <a:schemeClr val="lt1"/>
+          </a:fontRef>
+        </p:style>
+        <p:txBody>
+          <a:bodyPr rtlCol="0" anchor="ctr"/>
+          <a:lstStyle/>
+          <a:p>
+            <a:pPr algn="ctr"/>
+            <a:endParaRPr lang="en-DK"/>
+          </a:p>
+        </p:txBody>
+      </p:sp>
+      <p:sp>
+        <p:nvSpPr>
+          <p:cNvPr id="11" name="Rectangle 10">
+            <a:extLst>
+              <a:ext uri="{FF2B5EF4-FFF2-40B4-BE49-F238E27FC236}">
+                <a16:creationId xmlns:a16="http://schemas.microsoft.com/office/drawing/2014/main" id="{A6FE7FBE-DA88-6ACF-509D-592D10C125B0}"/>
+              </a:ext>
+            </a:extLst>
+          </p:cNvPr>
+          <p:cNvSpPr/>
+          <p:nvPr/>
+        </p:nvSpPr>
+        <p:spPr>
+          <a:xfrm>
+            <a:off x="4460702" y="3669319"/>
+            <a:ext cx="1014268" cy="428770"/>
+          </a:xfrm>
+          <a:prstGeom prst="rect">
+            <a:avLst/>
+          </a:prstGeom>
+          <a:noFill/>
+          <a:ln w="28575">
+            <a:solidFill>
+              <a:srgbClr val="FF0000"/>
+            </a:solidFill>
+          </a:ln>
+        </p:spPr>
+        <p:style>
+          <a:lnRef idx="2">
+            <a:schemeClr val="accent1">
+              <a:shade val="15000"/>
+            </a:schemeClr>
+          </a:lnRef>
+          <a:fillRef idx="1">
+            <a:schemeClr val="accent1"/>
+          </a:fillRef>
+          <a:effectRef idx="0">
+            <a:schemeClr val="accent1"/>
+          </a:effectRef>
+          <a:fontRef idx="minor">
+            <a:schemeClr val="lt1"/>
+          </a:fontRef>
+        </p:style>
+        <p:txBody>
+          <a:bodyPr rtlCol="0" anchor="ctr"/>
+          <a:lstStyle/>
+          <a:p>
+            <a:pPr algn="ctr"/>
+            <a:endParaRPr lang="en-DK"/>
+          </a:p>
+        </p:txBody>
+      </p:sp>
+      <p:cxnSp>
+        <p:nvCxnSpPr>
+          <p:cNvPr id="15" name="Straight Arrow Connector 14">
+            <a:extLst>
+              <a:ext uri="{FF2B5EF4-FFF2-40B4-BE49-F238E27FC236}">
+                <a16:creationId xmlns:a16="http://schemas.microsoft.com/office/drawing/2014/main" id="{F45A180E-078B-365F-6DF9-4D666B14CEAB}"/>
+              </a:ext>
+            </a:extLst>
+          </p:cNvPr>
+          <p:cNvCxnSpPr>
+            <a:cxnSpLocks/>
+            <a:stCxn id="26" idx="1"/>
+            <a:endCxn id="8" idx="3"/>
+          </p:cNvCxnSpPr>
+          <p:nvPr/>
+        </p:nvCxnSpPr>
+        <p:spPr>
+          <a:xfrm flipH="1" flipV="1">
+            <a:off x="5474970" y="2567256"/>
+            <a:ext cx="342900" cy="1"/>
+          </a:xfrm>
+          <a:prstGeom prst="straightConnector1">
+            <a:avLst/>
+          </a:prstGeom>
+          <a:ln w="38100">
+            <a:solidFill>
+              <a:schemeClr val="tx1"/>
+            </a:solidFill>
+            <a:tailEnd type="triangle"/>
+          </a:ln>
+        </p:spPr>
+        <p:style>
+          <a:lnRef idx="2">
+            <a:schemeClr val="accent1"/>
+          </a:lnRef>
+          <a:fillRef idx="0">
+            <a:schemeClr val="accent1"/>
+          </a:fillRef>
+          <a:effectRef idx="1">
+            <a:schemeClr val="accent1"/>
+          </a:effectRef>
+          <a:fontRef idx="minor">
+            <a:schemeClr val="tx1"/>
+          </a:fontRef>
+        </p:style>
+      </p:cxnSp>
+      <p:cxnSp>
+        <p:nvCxnSpPr>
+          <p:cNvPr id="17" name="Straight Arrow Connector 16">
+            <a:extLst>
+              <a:ext uri="{FF2B5EF4-FFF2-40B4-BE49-F238E27FC236}">
+                <a16:creationId xmlns:a16="http://schemas.microsoft.com/office/drawing/2014/main" id="{58EAD067-62C1-75BB-ED87-98042510D5F1}"/>
+              </a:ext>
+            </a:extLst>
+          </p:cNvPr>
+          <p:cNvCxnSpPr>
+            <a:cxnSpLocks/>
+            <a:stCxn id="28" idx="1"/>
+            <a:endCxn id="9" idx="3"/>
+          </p:cNvCxnSpPr>
+          <p:nvPr/>
+        </p:nvCxnSpPr>
+        <p:spPr>
+          <a:xfrm flipH="1">
+            <a:off x="5474970" y="2992505"/>
+            <a:ext cx="342900" cy="1183"/>
+          </a:xfrm>
+          <a:prstGeom prst="straightConnector1">
+            <a:avLst/>
+          </a:prstGeom>
+          <a:ln w="38100">
+            <a:solidFill>
+              <a:schemeClr val="tx1"/>
+            </a:solidFill>
+            <a:tailEnd type="triangle"/>
+          </a:ln>
+        </p:spPr>
+        <p:style>
+          <a:lnRef idx="2">
+            <a:schemeClr val="accent1"/>
+          </a:lnRef>
+          <a:fillRef idx="0">
+            <a:schemeClr val="accent1"/>
+          </a:fillRef>
+          <a:effectRef idx="1">
+            <a:schemeClr val="accent1"/>
+          </a:effectRef>
+          <a:fontRef idx="minor">
+            <a:schemeClr val="tx1"/>
+          </a:fontRef>
+        </p:style>
+      </p:cxnSp>
+      <p:cxnSp>
+        <p:nvCxnSpPr>
+          <p:cNvPr id="23" name="Straight Arrow Connector 22">
+            <a:extLst>
+              <a:ext uri="{FF2B5EF4-FFF2-40B4-BE49-F238E27FC236}">
+                <a16:creationId xmlns:a16="http://schemas.microsoft.com/office/drawing/2014/main" id="{72B89881-1F68-1A61-4E12-9B3152109BD5}"/>
+              </a:ext>
+            </a:extLst>
+          </p:cNvPr>
+          <p:cNvCxnSpPr>
+            <a:cxnSpLocks/>
+            <a:stCxn id="30" idx="1"/>
+            <a:endCxn id="10" idx="3"/>
+          </p:cNvCxnSpPr>
+          <p:nvPr/>
+        </p:nvCxnSpPr>
+        <p:spPr>
+          <a:xfrm flipH="1" flipV="1">
+            <a:off x="5474970" y="3412683"/>
+            <a:ext cx="342899" cy="6254"/>
+          </a:xfrm>
+          <a:prstGeom prst="straightConnector1">
+            <a:avLst/>
+          </a:prstGeom>
+          <a:ln w="38100">
+            <a:solidFill>
+              <a:schemeClr val="tx1"/>
+            </a:solidFill>
+            <a:tailEnd type="triangle"/>
+          </a:ln>
+        </p:spPr>
+        <p:style>
+          <a:lnRef idx="2">
+            <a:schemeClr val="accent1"/>
+          </a:lnRef>
+          <a:fillRef idx="0">
+            <a:schemeClr val="accent1"/>
+          </a:fillRef>
+          <a:effectRef idx="1">
+            <a:schemeClr val="accent1"/>
+          </a:effectRef>
+          <a:fontRef idx="minor">
+            <a:schemeClr val="tx1"/>
+          </a:fontRef>
+        </p:style>
+      </p:cxnSp>
+      <p:sp>
+        <p:nvSpPr>
+          <p:cNvPr id="26" name="TextBox 25">
+            <a:extLst>
+              <a:ext uri="{FF2B5EF4-FFF2-40B4-BE49-F238E27FC236}">
+                <a16:creationId xmlns:a16="http://schemas.microsoft.com/office/drawing/2014/main" id="{A0E605B0-1949-A8BC-E20A-01B43F75D430}"/>
+              </a:ext>
+            </a:extLst>
+          </p:cNvPr>
+          <p:cNvSpPr txBox="1"/>
+          <p:nvPr/>
+        </p:nvSpPr>
+        <p:spPr>
+          <a:xfrm>
+            <a:off x="5817870" y="2336424"/>
+            <a:ext cx="5863272" cy="461665"/>
+          </a:xfrm>
+          <a:prstGeom prst="rect">
+            <a:avLst/>
+          </a:prstGeom>
+          <a:noFill/>
+        </p:spPr>
+        <p:txBody>
+          <a:bodyPr wrap="none" rtlCol="0">
+            <a:spAutoFit/>
+          </a:bodyPr>
+          <a:lstStyle/>
+          <a:p>
+            <a:r>
+              <a:rPr lang="en-GB" sz="2400" dirty="0"/>
+              <a:t>Name that is displayed to the experimenter</a:t>
+            </a:r>
+            <a:endParaRPr lang="en-DK" sz="2400" dirty="0"/>
+          </a:p>
+        </p:txBody>
+      </p:sp>
+      <p:sp>
+        <p:nvSpPr>
+          <p:cNvPr id="28" name="TextBox 27">
+            <a:extLst>
+              <a:ext uri="{FF2B5EF4-FFF2-40B4-BE49-F238E27FC236}">
+                <a16:creationId xmlns:a16="http://schemas.microsoft.com/office/drawing/2014/main" id="{18025A67-6066-1A0F-08EC-D36A42749870}"/>
+              </a:ext>
+            </a:extLst>
+          </p:cNvPr>
+          <p:cNvSpPr txBox="1"/>
+          <p:nvPr/>
+        </p:nvSpPr>
+        <p:spPr>
+          <a:xfrm>
+            <a:off x="5817870" y="2761672"/>
+            <a:ext cx="3731471" cy="461665"/>
+          </a:xfrm>
+          <a:prstGeom prst="rect">
+            <a:avLst/>
+          </a:prstGeom>
+          <a:noFill/>
+        </p:spPr>
+        <p:txBody>
+          <a:bodyPr wrap="none" rtlCol="0">
+            <a:spAutoFit/>
+          </a:bodyPr>
+          <a:lstStyle/>
+          <a:p>
+            <a:r>
+              <a:rPr lang="en-GB" sz="2400" dirty="0"/>
+              <a:t>Experimental setup variant</a:t>
+            </a:r>
+            <a:endParaRPr lang="en-DK" sz="2400" dirty="0"/>
+          </a:p>
+        </p:txBody>
+      </p:sp>
+      <p:sp>
+        <p:nvSpPr>
+          <p:cNvPr id="30" name="TextBox 29">
+            <a:extLst>
+              <a:ext uri="{FF2B5EF4-FFF2-40B4-BE49-F238E27FC236}">
+                <a16:creationId xmlns:a16="http://schemas.microsoft.com/office/drawing/2014/main" id="{60DFDEC9-4700-B6BD-0CE6-3678366177EE}"/>
+              </a:ext>
+            </a:extLst>
+          </p:cNvPr>
+          <p:cNvSpPr txBox="1"/>
+          <p:nvPr/>
+        </p:nvSpPr>
+        <p:spPr>
+          <a:xfrm>
+            <a:off x="5817869" y="3188104"/>
+            <a:ext cx="4830553" cy="461665"/>
+          </a:xfrm>
+          <a:prstGeom prst="rect">
+            <a:avLst/>
+          </a:prstGeom>
+          <a:noFill/>
+        </p:spPr>
+        <p:txBody>
+          <a:bodyPr wrap="none" rtlCol="0">
+            <a:spAutoFit/>
+          </a:bodyPr>
+          <a:lstStyle/>
+          <a:p>
+            <a:r>
+              <a:rPr lang="en-GB" sz="2400" dirty="0"/>
+              <a:t>Store the protocol in the repository</a:t>
+            </a:r>
+            <a:endParaRPr lang="en-DK" sz="2400" dirty="0"/>
+          </a:p>
+        </p:txBody>
+      </p:sp>
+      <p:sp>
+        <p:nvSpPr>
+          <p:cNvPr id="32" name="TextBox 31">
+            <a:extLst>
+              <a:ext uri="{FF2B5EF4-FFF2-40B4-BE49-F238E27FC236}">
+                <a16:creationId xmlns:a16="http://schemas.microsoft.com/office/drawing/2014/main" id="{6B71552F-72C9-0259-BC8E-58F93AB9F1C5}"/>
+              </a:ext>
+            </a:extLst>
+          </p:cNvPr>
+          <p:cNvSpPr txBox="1"/>
+          <p:nvPr/>
+        </p:nvSpPr>
+        <p:spPr>
+          <a:xfrm>
+            <a:off x="5817868" y="3652848"/>
+            <a:ext cx="4153573" cy="461665"/>
+          </a:xfrm>
+          <a:prstGeom prst="rect">
+            <a:avLst/>
+          </a:prstGeom>
+          <a:noFill/>
+        </p:spPr>
+        <p:txBody>
+          <a:bodyPr wrap="none" rtlCol="0">
+            <a:spAutoFit/>
+          </a:bodyPr>
+          <a:lstStyle/>
+          <a:p>
+            <a:r>
+              <a:rPr lang="en-GB" sz="2400" dirty="0"/>
+              <a:t>Click to create the experiment</a:t>
+            </a:r>
+            <a:endParaRPr lang="en-DK" sz="2400" dirty="0"/>
+          </a:p>
+        </p:txBody>
+      </p:sp>
+      <p:cxnSp>
+        <p:nvCxnSpPr>
+          <p:cNvPr id="33" name="Straight Arrow Connector 32">
+            <a:extLst>
+              <a:ext uri="{FF2B5EF4-FFF2-40B4-BE49-F238E27FC236}">
+                <a16:creationId xmlns:a16="http://schemas.microsoft.com/office/drawing/2014/main" id="{C6045B32-3FC4-2023-0C9D-40AE9EB4EC9C}"/>
+              </a:ext>
+            </a:extLst>
+          </p:cNvPr>
+          <p:cNvCxnSpPr>
+            <a:cxnSpLocks/>
+            <a:stCxn id="32" idx="1"/>
+            <a:endCxn id="11" idx="3"/>
+          </p:cNvCxnSpPr>
+          <p:nvPr/>
+        </p:nvCxnSpPr>
+        <p:spPr>
+          <a:xfrm flipH="1">
+            <a:off x="5474970" y="3883681"/>
+            <a:ext cx="342898" cy="23"/>
+          </a:xfrm>
+          <a:prstGeom prst="straightConnector1">
+            <a:avLst/>
+          </a:prstGeom>
+          <a:ln w="38100">
+            <a:solidFill>
+              <a:schemeClr val="tx1"/>
+            </a:solidFill>
+            <a:tailEnd type="triangle"/>
+          </a:ln>
+        </p:spPr>
+        <p:style>
+          <a:lnRef idx="2">
+            <a:schemeClr val="accent1"/>
+          </a:lnRef>
+          <a:fillRef idx="0">
+            <a:schemeClr val="accent1"/>
+          </a:fillRef>
+          <a:effectRef idx="1">
+            <a:schemeClr val="accent1"/>
+          </a:effectRef>
+          <a:fontRef idx="minor">
+            <a:schemeClr val="tx1"/>
+          </a:fontRef>
+        </p:style>
+      </p:cxnSp>
+    </p:spTree>
+    <p:extLst>
+      <p:ext uri="{BB962C8B-B14F-4D97-AF65-F5344CB8AC3E}">
+        <p14:creationId xmlns:p14="http://schemas.microsoft.com/office/powerpoint/2010/main" val="251639221"/>
+      </p:ext>
+    </p:extLst>
+  </p:cSld>
+  <p:clrMapOvr>
+    <a:masterClrMapping/>
+  </p:clrMapOvr>
+</p:sld>
+</file>
+
+<file path=ppt/slides/slide8.xml><?xml version="1.0" encoding="utf-8"?>
+<p:sld xmlns:a="http://schemas.openxmlformats.org/drawingml/2006/main" xmlns:r="http://schemas.openxmlformats.org/officeDocument/2006/relationships" xmlns:p="http://schemas.openxmlformats.org/presentationml/2006/main">
+  <p:cSld>
+    <p:spTree>
+      <p:nvGrpSpPr>
+        <p:cNvPr id="1" name=""/>
+        <p:cNvGrpSpPr/>
+        <p:nvPr/>
+      </p:nvGrpSpPr>
+      <p:grpSpPr>
+        <a:xfrm>
+          <a:off x="0" y="0"/>
+          <a:ext cx="0" cy="0"/>
+          <a:chOff x="0" y="0"/>
+          <a:chExt cx="0" cy="0"/>
+        </a:xfrm>
+      </p:grpSpPr>
+      <p:pic>
+        <p:nvPicPr>
+          <p:cNvPr id="3" name="Picture 2">
+            <a:extLst>
+              <a:ext uri="{FF2B5EF4-FFF2-40B4-BE49-F238E27FC236}">
+                <a16:creationId xmlns:a16="http://schemas.microsoft.com/office/drawing/2014/main" id="{4EF425E4-D863-92C7-397E-876543B6C702}"/>
+              </a:ext>
+            </a:extLst>
+          </p:cNvPr>
+          <p:cNvPicPr>
+            <a:picLocks noChangeAspect="1"/>
+          </p:cNvPicPr>
+          <p:nvPr/>
+        </p:nvPicPr>
+        <p:blipFill>
+          <a:blip r:embed="rId2"/>
+          <a:stretch>
+            <a:fillRect/>
+          </a:stretch>
+        </p:blipFill>
+        <p:spPr>
+          <a:xfrm>
+            <a:off x="2526030" y="1404133"/>
+            <a:ext cx="7429500" cy="3359347"/>
+          </a:xfrm>
+          <a:prstGeom prst="rect">
+            <a:avLst/>
+          </a:prstGeom>
+        </p:spPr>
+      </p:pic>
+      <p:sp>
+        <p:nvSpPr>
+          <p:cNvPr id="4" name="TextBox 3">
+            <a:extLst>
+              <a:ext uri="{FF2B5EF4-FFF2-40B4-BE49-F238E27FC236}">
+                <a16:creationId xmlns:a16="http://schemas.microsoft.com/office/drawing/2014/main" id="{E9EADEC2-A331-5BA3-6CAF-1A880DD6A21D}"/>
+              </a:ext>
+            </a:extLst>
+          </p:cNvPr>
+          <p:cNvSpPr txBox="1"/>
+          <p:nvPr/>
+        </p:nvSpPr>
+        <p:spPr>
+          <a:xfrm>
+            <a:off x="297180" y="5017769"/>
+            <a:ext cx="3949864" cy="461665"/>
+          </a:xfrm>
+          <a:prstGeom prst="rect">
+            <a:avLst/>
+          </a:prstGeom>
+          <a:noFill/>
+        </p:spPr>
+        <p:txBody>
+          <a:bodyPr wrap="none" rtlCol="0">
+            <a:spAutoFit/>
+          </a:bodyPr>
+          <a:lstStyle/>
+          <a:p>
+            <a:r>
+              <a:rPr lang="en-GB" sz="2400" dirty="0"/>
+              <a:t>Select the Experiments page</a:t>
+            </a:r>
+            <a:endParaRPr lang="en-DK" sz="2400" dirty="0"/>
+          </a:p>
+        </p:txBody>
+      </p:sp>
+      <p:sp>
+        <p:nvSpPr>
+          <p:cNvPr id="5" name="Rectangle 4">
+            <a:extLst>
+              <a:ext uri="{FF2B5EF4-FFF2-40B4-BE49-F238E27FC236}">
+                <a16:creationId xmlns:a16="http://schemas.microsoft.com/office/drawing/2014/main" id="{D4D021E6-3134-A066-2FB0-74EEDCFF0B95}"/>
+              </a:ext>
+            </a:extLst>
+          </p:cNvPr>
+          <p:cNvSpPr/>
+          <p:nvPr/>
+        </p:nvSpPr>
+        <p:spPr>
+          <a:xfrm>
+            <a:off x="2530290" y="3272662"/>
+            <a:ext cx="592640" cy="561468"/>
+          </a:xfrm>
+          <a:prstGeom prst="rect">
+            <a:avLst/>
+          </a:prstGeom>
+          <a:noFill/>
+          <a:ln w="28575">
+            <a:solidFill>
+              <a:srgbClr val="FF0000"/>
+            </a:solidFill>
+          </a:ln>
+        </p:spPr>
+        <p:style>
+          <a:lnRef idx="2">
+            <a:schemeClr val="accent1">
+              <a:shade val="15000"/>
+            </a:schemeClr>
+          </a:lnRef>
+          <a:fillRef idx="1">
+            <a:schemeClr val="accent1"/>
+          </a:fillRef>
+          <a:effectRef idx="0">
+            <a:schemeClr val="accent1"/>
+          </a:effectRef>
+          <a:fontRef idx="minor">
+            <a:schemeClr val="lt1"/>
+          </a:fontRef>
+        </p:style>
+        <p:txBody>
+          <a:bodyPr rtlCol="0" anchor="ctr"/>
+          <a:lstStyle/>
+          <a:p>
+            <a:pPr algn="ctr"/>
+            <a:endParaRPr lang="en-DK"/>
+          </a:p>
+        </p:txBody>
+      </p:sp>
+      <p:cxnSp>
+        <p:nvCxnSpPr>
+          <p:cNvPr id="6" name="Connector: Elbow 5">
+            <a:extLst>
+              <a:ext uri="{FF2B5EF4-FFF2-40B4-BE49-F238E27FC236}">
+                <a16:creationId xmlns:a16="http://schemas.microsoft.com/office/drawing/2014/main" id="{EF64CC2F-D387-2A93-16DC-817A313A1569}"/>
+              </a:ext>
+            </a:extLst>
+          </p:cNvPr>
+          <p:cNvCxnSpPr>
+            <a:cxnSpLocks/>
+            <a:stCxn id="4" idx="0"/>
+            <a:endCxn id="5" idx="1"/>
+          </p:cNvCxnSpPr>
+          <p:nvPr/>
+        </p:nvCxnSpPr>
+        <p:spPr>
+          <a:xfrm rot="5400000" flipH="1" flipV="1">
+            <a:off x="1669015" y="4156494"/>
+            <a:ext cx="1464373" cy="258178"/>
+          </a:xfrm>
+          <a:prstGeom prst="bentConnector2">
+            <a:avLst/>
+          </a:prstGeom>
+          <a:ln w="38100">
+            <a:solidFill>
+              <a:schemeClr val="tx1"/>
+            </a:solidFill>
+            <a:tailEnd type="triangle"/>
+          </a:ln>
+        </p:spPr>
+        <p:style>
+          <a:lnRef idx="2">
+            <a:schemeClr val="accent1"/>
+          </a:lnRef>
+          <a:fillRef idx="0">
+            <a:schemeClr val="accent1"/>
+          </a:fillRef>
+          <a:effectRef idx="1">
+            <a:schemeClr val="accent1"/>
+          </a:effectRef>
+          <a:fontRef idx="minor">
+            <a:schemeClr val="tx1"/>
+          </a:fontRef>
+        </p:style>
+      </p:cxnSp>
+      <p:sp>
+        <p:nvSpPr>
+          <p:cNvPr id="8" name="TextBox 7">
+            <a:extLst>
+              <a:ext uri="{FF2B5EF4-FFF2-40B4-BE49-F238E27FC236}">
+                <a16:creationId xmlns:a16="http://schemas.microsoft.com/office/drawing/2014/main" id="{C968A973-3DE4-1A19-0023-F08819EFCC27}"/>
+              </a:ext>
+            </a:extLst>
+          </p:cNvPr>
+          <p:cNvSpPr txBox="1"/>
+          <p:nvPr/>
+        </p:nvSpPr>
+        <p:spPr>
+          <a:xfrm>
+            <a:off x="2092465" y="789777"/>
+            <a:ext cx="4377737" cy="461665"/>
+          </a:xfrm>
+          <a:prstGeom prst="rect">
+            <a:avLst/>
+          </a:prstGeom>
+          <a:noFill/>
+        </p:spPr>
+        <p:txBody>
+          <a:bodyPr wrap="none" rtlCol="0">
+            <a:spAutoFit/>
+          </a:bodyPr>
+          <a:lstStyle/>
+          <a:p>
+            <a:r>
+              <a:rPr lang="en-GB" sz="2400" dirty="0"/>
+              <a:t>Select the experiment to mange</a:t>
+            </a:r>
+            <a:endParaRPr lang="en-DK" sz="2400" dirty="0"/>
+          </a:p>
+        </p:txBody>
+      </p:sp>
+      <p:sp>
+        <p:nvSpPr>
+          <p:cNvPr id="9" name="Rectangle 8">
+            <a:extLst>
+              <a:ext uri="{FF2B5EF4-FFF2-40B4-BE49-F238E27FC236}">
+                <a16:creationId xmlns:a16="http://schemas.microsoft.com/office/drawing/2014/main" id="{692C1DD8-E2AD-4BC3-7414-828C6C05E660}"/>
+              </a:ext>
+            </a:extLst>
+          </p:cNvPr>
+          <p:cNvSpPr/>
+          <p:nvPr/>
+        </p:nvSpPr>
+        <p:spPr>
+          <a:xfrm>
+            <a:off x="3145790" y="2228433"/>
+            <a:ext cx="2249170" cy="343317"/>
+          </a:xfrm>
+          <a:prstGeom prst="rect">
+            <a:avLst/>
+          </a:prstGeom>
+          <a:noFill/>
+          <a:ln w="28575">
+            <a:solidFill>
+              <a:srgbClr val="FF0000"/>
+            </a:solidFill>
+          </a:ln>
+        </p:spPr>
+        <p:style>
+          <a:lnRef idx="2">
+            <a:schemeClr val="accent1">
+              <a:shade val="15000"/>
+            </a:schemeClr>
+          </a:lnRef>
+          <a:fillRef idx="1">
+            <a:schemeClr val="accent1"/>
+          </a:fillRef>
+          <a:effectRef idx="0">
+            <a:schemeClr val="accent1"/>
+          </a:effectRef>
+          <a:fontRef idx="minor">
+            <a:schemeClr val="lt1"/>
+          </a:fontRef>
+        </p:style>
+        <p:txBody>
+          <a:bodyPr rtlCol="0" anchor="ctr"/>
+          <a:lstStyle/>
+          <a:p>
+            <a:pPr algn="ctr"/>
+            <a:endParaRPr lang="en-DK"/>
+          </a:p>
+        </p:txBody>
+      </p:sp>
+      <p:cxnSp>
+        <p:nvCxnSpPr>
+          <p:cNvPr id="10" name="Straight Arrow Connector 9">
+            <a:extLst>
+              <a:ext uri="{FF2B5EF4-FFF2-40B4-BE49-F238E27FC236}">
+                <a16:creationId xmlns:a16="http://schemas.microsoft.com/office/drawing/2014/main" id="{46E87455-0E83-2C3C-4D75-2EBE3DD1B4EA}"/>
+              </a:ext>
+            </a:extLst>
+          </p:cNvPr>
+          <p:cNvCxnSpPr>
+            <a:cxnSpLocks/>
+            <a:stCxn id="8" idx="2"/>
+            <a:endCxn id="9" idx="0"/>
+          </p:cNvCxnSpPr>
+          <p:nvPr/>
+        </p:nvCxnSpPr>
+        <p:spPr>
+          <a:xfrm flipH="1">
+            <a:off x="4270375" y="1251442"/>
+            <a:ext cx="10959" cy="976991"/>
+          </a:xfrm>
+          <a:prstGeom prst="straightConnector1">
+            <a:avLst/>
+          </a:prstGeom>
+          <a:ln w="38100">
+            <a:solidFill>
+              <a:schemeClr val="tx1"/>
+            </a:solidFill>
+            <a:tailEnd type="triangle"/>
+          </a:ln>
+        </p:spPr>
+        <p:style>
+          <a:lnRef idx="2">
+            <a:schemeClr val="accent1"/>
+          </a:lnRef>
+          <a:fillRef idx="0">
+            <a:schemeClr val="accent1"/>
+          </a:fillRef>
+          <a:effectRef idx="1">
+            <a:schemeClr val="accent1"/>
+          </a:effectRef>
+          <a:fontRef idx="minor">
+            <a:schemeClr val="tx1"/>
+          </a:fontRef>
+        </p:style>
+      </p:cxnSp>
+      <p:sp>
+        <p:nvSpPr>
+          <p:cNvPr id="13" name="Rectangle 12">
+            <a:extLst>
+              <a:ext uri="{FF2B5EF4-FFF2-40B4-BE49-F238E27FC236}">
+                <a16:creationId xmlns:a16="http://schemas.microsoft.com/office/drawing/2014/main" id="{02E6157E-E772-06E4-86BE-8602F6E1FFD2}"/>
+              </a:ext>
+            </a:extLst>
+          </p:cNvPr>
+          <p:cNvSpPr/>
+          <p:nvPr/>
+        </p:nvSpPr>
+        <p:spPr>
+          <a:xfrm>
+            <a:off x="5437505" y="1850154"/>
+            <a:ext cx="725620" cy="2890466"/>
+          </a:xfrm>
+          <a:prstGeom prst="rect">
+            <a:avLst/>
+          </a:prstGeom>
+          <a:noFill/>
+          <a:ln w="28575">
+            <a:solidFill>
+              <a:srgbClr val="FF0000"/>
+            </a:solidFill>
+          </a:ln>
+        </p:spPr>
+        <p:style>
+          <a:lnRef idx="2">
+            <a:schemeClr val="accent1">
+              <a:shade val="15000"/>
+            </a:schemeClr>
+          </a:lnRef>
+          <a:fillRef idx="1">
+            <a:schemeClr val="accent1"/>
+          </a:fillRef>
+          <a:effectRef idx="0">
+            <a:schemeClr val="accent1"/>
+          </a:effectRef>
+          <a:fontRef idx="minor">
+            <a:schemeClr val="lt1"/>
+          </a:fontRef>
+        </p:style>
+        <p:txBody>
+          <a:bodyPr rtlCol="0" anchor="ctr"/>
+          <a:lstStyle/>
+          <a:p>
+            <a:pPr algn="ctr"/>
+            <a:endParaRPr lang="en-DK"/>
+          </a:p>
+        </p:txBody>
+      </p:sp>
+      <p:sp>
+        <p:nvSpPr>
+          <p:cNvPr id="14" name="TextBox 13">
+            <a:extLst>
+              <a:ext uri="{FF2B5EF4-FFF2-40B4-BE49-F238E27FC236}">
+                <a16:creationId xmlns:a16="http://schemas.microsoft.com/office/drawing/2014/main" id="{09B3C657-F866-0E68-BCCC-8E42CD32CB17}"/>
+              </a:ext>
+            </a:extLst>
+          </p:cNvPr>
+          <p:cNvSpPr txBox="1"/>
+          <p:nvPr/>
+        </p:nvSpPr>
+        <p:spPr>
+          <a:xfrm>
+            <a:off x="3906463" y="5479434"/>
+            <a:ext cx="3787704" cy="461665"/>
+          </a:xfrm>
+          <a:prstGeom prst="rect">
+            <a:avLst/>
+          </a:prstGeom>
+          <a:noFill/>
+        </p:spPr>
+        <p:txBody>
+          <a:bodyPr wrap="none" rtlCol="0">
+            <a:spAutoFit/>
+          </a:bodyPr>
+          <a:lstStyle/>
+          <a:p>
+            <a:r>
+              <a:rPr lang="en-GB" sz="2400" dirty="0"/>
+              <a:t>Select the experiment page</a:t>
+            </a:r>
+            <a:endParaRPr lang="en-DK" sz="2400" dirty="0"/>
+          </a:p>
+        </p:txBody>
+      </p:sp>
+      <p:sp>
+        <p:nvSpPr>
+          <p:cNvPr id="15" name="Rectangle 14">
+            <a:extLst>
+              <a:ext uri="{FF2B5EF4-FFF2-40B4-BE49-F238E27FC236}">
+                <a16:creationId xmlns:a16="http://schemas.microsoft.com/office/drawing/2014/main" id="{7F9B9E7C-7535-E502-870F-ADCC0588FC4C}"/>
+              </a:ext>
+            </a:extLst>
+          </p:cNvPr>
+          <p:cNvSpPr/>
+          <p:nvPr/>
+        </p:nvSpPr>
+        <p:spPr>
+          <a:xfrm>
+            <a:off x="6163124" y="1850154"/>
+            <a:ext cx="3756763" cy="2890466"/>
+          </a:xfrm>
+          <a:prstGeom prst="rect">
+            <a:avLst/>
+          </a:prstGeom>
+          <a:noFill/>
+          <a:ln w="28575">
+            <a:solidFill>
+              <a:srgbClr val="FF0000"/>
+            </a:solidFill>
+          </a:ln>
+        </p:spPr>
+        <p:style>
+          <a:lnRef idx="2">
+            <a:schemeClr val="accent1">
+              <a:shade val="15000"/>
+            </a:schemeClr>
+          </a:lnRef>
+          <a:fillRef idx="1">
+            <a:schemeClr val="accent1"/>
+          </a:fillRef>
+          <a:effectRef idx="0">
+            <a:schemeClr val="accent1"/>
+          </a:effectRef>
+          <a:fontRef idx="minor">
+            <a:schemeClr val="lt1"/>
+          </a:fontRef>
+        </p:style>
+        <p:txBody>
+          <a:bodyPr rtlCol="0" anchor="ctr"/>
+          <a:lstStyle/>
+          <a:p>
+            <a:pPr algn="ctr"/>
+            <a:endParaRPr lang="en-DK"/>
+          </a:p>
+        </p:txBody>
+      </p:sp>
+      <p:cxnSp>
+        <p:nvCxnSpPr>
+          <p:cNvPr id="16" name="Straight Arrow Connector 15">
+            <a:extLst>
+              <a:ext uri="{FF2B5EF4-FFF2-40B4-BE49-F238E27FC236}">
+                <a16:creationId xmlns:a16="http://schemas.microsoft.com/office/drawing/2014/main" id="{B2A80DC5-FC87-6D1C-286E-CAF2C10FB41E}"/>
+              </a:ext>
+            </a:extLst>
+          </p:cNvPr>
+          <p:cNvCxnSpPr>
+            <a:cxnSpLocks/>
+            <a:stCxn id="14" idx="0"/>
+            <a:endCxn id="13" idx="2"/>
+          </p:cNvCxnSpPr>
+          <p:nvPr/>
+        </p:nvCxnSpPr>
+        <p:spPr>
+          <a:xfrm flipV="1">
+            <a:off x="5800315" y="4740620"/>
+            <a:ext cx="0" cy="738814"/>
+          </a:xfrm>
+          <a:prstGeom prst="straightConnector1">
+            <a:avLst/>
+          </a:prstGeom>
+          <a:ln w="38100">
+            <a:solidFill>
+              <a:schemeClr val="tx1"/>
+            </a:solidFill>
+            <a:tailEnd type="triangle"/>
+          </a:ln>
+        </p:spPr>
+        <p:style>
+          <a:lnRef idx="2">
+            <a:schemeClr val="accent1"/>
+          </a:lnRef>
+          <a:fillRef idx="0">
+            <a:schemeClr val="accent1"/>
+          </a:fillRef>
+          <a:effectRef idx="1">
+            <a:schemeClr val="accent1"/>
+          </a:effectRef>
+          <a:fontRef idx="minor">
+            <a:schemeClr val="tx1"/>
+          </a:fontRef>
+        </p:style>
+      </p:cxnSp>
+      <p:sp>
+        <p:nvSpPr>
+          <p:cNvPr id="22" name="TextBox 21">
+            <a:extLst>
+              <a:ext uri="{FF2B5EF4-FFF2-40B4-BE49-F238E27FC236}">
+                <a16:creationId xmlns:a16="http://schemas.microsoft.com/office/drawing/2014/main" id="{24639197-BCBA-3BCD-64E3-5BC0B964A43E}"/>
+              </a:ext>
+            </a:extLst>
+          </p:cNvPr>
+          <p:cNvSpPr txBox="1"/>
+          <p:nvPr/>
+        </p:nvSpPr>
+        <p:spPr>
+          <a:xfrm>
+            <a:off x="6109323" y="5017769"/>
+            <a:ext cx="3861570" cy="461665"/>
+          </a:xfrm>
+          <a:prstGeom prst="rect">
+            <a:avLst/>
+          </a:prstGeom>
+          <a:noFill/>
+        </p:spPr>
+        <p:txBody>
+          <a:bodyPr wrap="none" rtlCol="0">
+            <a:spAutoFit/>
+          </a:bodyPr>
+          <a:lstStyle/>
+          <a:p>
+            <a:r>
+              <a:rPr lang="en-GB" sz="2400" dirty="0"/>
+              <a:t>Content of experiment page</a:t>
+            </a:r>
+            <a:endParaRPr lang="en-DK" sz="2400" dirty="0"/>
+          </a:p>
+        </p:txBody>
+      </p:sp>
+      <p:cxnSp>
+        <p:nvCxnSpPr>
+          <p:cNvPr id="23" name="Straight Arrow Connector 22">
+            <a:extLst>
+              <a:ext uri="{FF2B5EF4-FFF2-40B4-BE49-F238E27FC236}">
+                <a16:creationId xmlns:a16="http://schemas.microsoft.com/office/drawing/2014/main" id="{71BF9281-FA3C-22D9-C81F-52286AC410AE}"/>
+              </a:ext>
+            </a:extLst>
+          </p:cNvPr>
+          <p:cNvCxnSpPr>
+            <a:cxnSpLocks/>
+            <a:stCxn id="22" idx="0"/>
+            <a:endCxn id="15" idx="2"/>
+          </p:cNvCxnSpPr>
+          <p:nvPr/>
+        </p:nvCxnSpPr>
+        <p:spPr>
+          <a:xfrm flipV="1">
+            <a:off x="8040108" y="4740620"/>
+            <a:ext cx="1398" cy="277149"/>
+          </a:xfrm>
+          <a:prstGeom prst="straightConnector1">
+            <a:avLst/>
+          </a:prstGeom>
+          <a:ln w="38100">
+            <a:solidFill>
+              <a:schemeClr val="tx1"/>
+            </a:solidFill>
+            <a:tailEnd type="triangle"/>
+          </a:ln>
+        </p:spPr>
+        <p:style>
+          <a:lnRef idx="2">
+            <a:schemeClr val="accent1"/>
+          </a:lnRef>
+          <a:fillRef idx="0">
+            <a:schemeClr val="accent1"/>
+          </a:fillRef>
+          <a:effectRef idx="1">
+            <a:schemeClr val="accent1"/>
+          </a:effectRef>
+          <a:fontRef idx="minor">
+            <a:schemeClr val="tx1"/>
+          </a:fontRef>
+        </p:style>
+      </p:cxnSp>
+    </p:spTree>
+    <p:extLst>
+      <p:ext uri="{BB962C8B-B14F-4D97-AF65-F5344CB8AC3E}">
+        <p14:creationId xmlns:p14="http://schemas.microsoft.com/office/powerpoint/2010/main" val="212760252"/>
+      </p:ext>
+    </p:extLst>
+  </p:cSld>
+  <p:clrMapOvr>
+    <a:masterClrMapping/>
+  </p:clrMapOvr>
+</p:sld>
+</file>
+
+<file path=ppt/slides/slide9.xml><?xml version="1.0" encoding="utf-8"?>
+<p:sld xmlns:a="http://schemas.openxmlformats.org/drawingml/2006/main" xmlns:r="http://schemas.openxmlformats.org/officeDocument/2006/relationships" xmlns:p="http://schemas.openxmlformats.org/presentationml/2006/main">
+  <p:cSld>
+    <p:spTree>
+      <p:nvGrpSpPr>
+        <p:cNvPr id="1" name=""/>
+        <p:cNvGrpSpPr/>
+        <p:nvPr/>
+      </p:nvGrpSpPr>
+      <p:grpSpPr>
+        <a:xfrm>
+          <a:off x="0" y="0"/>
+          <a:ext cx="0" cy="0"/>
+          <a:chOff x="0" y="0"/>
+          <a:chExt cx="0" cy="0"/>
+        </a:xfrm>
+      </p:grpSpPr>
+      <p:pic>
+        <p:nvPicPr>
+          <p:cNvPr id="3" name="Picture 2">
+            <a:extLst>
+              <a:ext uri="{FF2B5EF4-FFF2-40B4-BE49-F238E27FC236}">
+                <a16:creationId xmlns:a16="http://schemas.microsoft.com/office/drawing/2014/main" id="{5E7841D2-9076-1115-3E04-ACB5B824EBE0}"/>
+              </a:ext>
+            </a:extLst>
+          </p:cNvPr>
+          <p:cNvPicPr>
+            <a:picLocks noChangeAspect="1"/>
+          </p:cNvPicPr>
+          <p:nvPr/>
+        </p:nvPicPr>
+        <p:blipFill>
+          <a:blip r:embed="rId2"/>
+          <a:srcRect l="14827" t="17624" r="13693" b="5555"/>
+          <a:stretch/>
+        </p:blipFill>
+        <p:spPr>
+          <a:xfrm>
+            <a:off x="2960370" y="2080259"/>
+            <a:ext cx="960120" cy="922095"/>
+          </a:xfrm>
+          <a:prstGeom prst="rect">
+            <a:avLst/>
+          </a:prstGeom>
+        </p:spPr>
+      </p:pic>
+      <p:pic>
+        <p:nvPicPr>
+          <p:cNvPr id="5" name="Picture 4">
+            <a:extLst>
+              <a:ext uri="{FF2B5EF4-FFF2-40B4-BE49-F238E27FC236}">
+                <a16:creationId xmlns:a16="http://schemas.microsoft.com/office/drawing/2014/main" id="{A4B20A22-C329-C066-81A5-4FFCB7E440A4}"/>
+              </a:ext>
+            </a:extLst>
+          </p:cNvPr>
+          <p:cNvPicPr>
+            <a:picLocks noChangeAspect="1"/>
+          </p:cNvPicPr>
+          <p:nvPr/>
+        </p:nvPicPr>
+        <p:blipFill>
+          <a:blip r:embed="rId3"/>
+          <a:srcRect l="18694" t="19338" r="11799"/>
+          <a:stretch/>
+        </p:blipFill>
+        <p:spPr>
+          <a:xfrm>
+            <a:off x="5246370" y="2080259"/>
+            <a:ext cx="960120" cy="922096"/>
+          </a:xfrm>
+          <a:prstGeom prst="rect">
+            <a:avLst/>
+          </a:prstGeom>
+        </p:spPr>
+      </p:pic>
+      <p:pic>
+        <p:nvPicPr>
+          <p:cNvPr id="7" name="Picture 6">
+            <a:extLst>
+              <a:ext uri="{FF2B5EF4-FFF2-40B4-BE49-F238E27FC236}">
+                <a16:creationId xmlns:a16="http://schemas.microsoft.com/office/drawing/2014/main" id="{3FC053F6-23A8-419F-3EE0-13A648637D78}"/>
+              </a:ext>
+            </a:extLst>
+          </p:cNvPr>
+          <p:cNvPicPr>
+            <a:picLocks noChangeAspect="1"/>
+          </p:cNvPicPr>
+          <p:nvPr/>
+        </p:nvPicPr>
+        <p:blipFill>
+          <a:blip r:embed="rId4"/>
+          <a:srcRect l="17607" t="18273" r="13361" b="5511"/>
+          <a:stretch/>
+        </p:blipFill>
+        <p:spPr>
+          <a:xfrm>
+            <a:off x="4103370" y="2080259"/>
+            <a:ext cx="960120" cy="922095"/>
+          </a:xfrm>
+          <a:prstGeom prst="rect">
+            <a:avLst/>
+          </a:prstGeom>
+        </p:spPr>
+      </p:pic>
+      <p:pic>
+        <p:nvPicPr>
+          <p:cNvPr id="11" name="Picture 10">
+            <a:extLst>
+              <a:ext uri="{FF2B5EF4-FFF2-40B4-BE49-F238E27FC236}">
+                <a16:creationId xmlns:a16="http://schemas.microsoft.com/office/drawing/2014/main" id="{4C6D0045-F94F-27F9-280F-3C6A6E8925BA}"/>
+              </a:ext>
+            </a:extLst>
+          </p:cNvPr>
+          <p:cNvPicPr>
+            <a:picLocks noChangeAspect="1"/>
+          </p:cNvPicPr>
+          <p:nvPr/>
+        </p:nvPicPr>
+        <p:blipFill>
+          <a:blip r:embed="rId5"/>
+          <a:srcRect l="16005" t="10754" r="13928"/>
+          <a:stretch/>
+        </p:blipFill>
+        <p:spPr>
+          <a:xfrm>
+            <a:off x="7623810" y="4132895"/>
+            <a:ext cx="800976" cy="731155"/>
+          </a:xfrm>
+          <a:prstGeom prst="rect">
+            <a:avLst/>
+          </a:prstGeom>
+        </p:spPr>
+      </p:pic>
+      <p:pic>
+        <p:nvPicPr>
+          <p:cNvPr id="13" name="Picture 12">
+            <a:extLst>
+              <a:ext uri="{FF2B5EF4-FFF2-40B4-BE49-F238E27FC236}">
+                <a16:creationId xmlns:a16="http://schemas.microsoft.com/office/drawing/2014/main" id="{F4A00717-4FA9-B686-F591-F5748BD8CEC0}"/>
+              </a:ext>
+            </a:extLst>
+          </p:cNvPr>
+          <p:cNvPicPr>
+            <a:picLocks noChangeAspect="1"/>
+          </p:cNvPicPr>
+          <p:nvPr/>
+        </p:nvPicPr>
+        <p:blipFill>
+          <a:blip r:embed="rId6"/>
+          <a:srcRect l="14526" t="11781" r="12361"/>
+          <a:stretch/>
+        </p:blipFill>
+        <p:spPr>
+          <a:xfrm>
+            <a:off x="5817870" y="4137660"/>
+            <a:ext cx="800976" cy="731155"/>
+          </a:xfrm>
+          <a:prstGeom prst="rect">
+            <a:avLst/>
+          </a:prstGeom>
+        </p:spPr>
+      </p:pic>
+      <p:pic>
+        <p:nvPicPr>
+          <p:cNvPr id="15" name="Picture 14">
+            <a:extLst>
+              <a:ext uri="{FF2B5EF4-FFF2-40B4-BE49-F238E27FC236}">
+                <a16:creationId xmlns:a16="http://schemas.microsoft.com/office/drawing/2014/main" id="{C8E623DF-D4D3-8E7E-DD16-880459D7C75E}"/>
+              </a:ext>
+            </a:extLst>
+          </p:cNvPr>
+          <p:cNvPicPr>
+            <a:picLocks noChangeAspect="1"/>
+          </p:cNvPicPr>
+          <p:nvPr/>
+        </p:nvPicPr>
+        <p:blipFill>
+          <a:blip r:embed="rId7"/>
+          <a:srcRect l="17624" t="12783" r="15646"/>
+          <a:stretch/>
+        </p:blipFill>
+        <p:spPr>
+          <a:xfrm>
+            <a:off x="8869680" y="4142423"/>
+            <a:ext cx="800976" cy="731155"/>
           </a:xfrm>
           <a:prstGeom prst="rect">
             <a:avLst/>
@@ -4822,7 +7936,7 @@
     </p:spTree>
     <p:extLst>
       <p:ext uri="{BB962C8B-B14F-4D97-AF65-F5344CB8AC3E}">
-        <p14:creationId xmlns:p14="http://schemas.microsoft.com/office/powerpoint/2010/main" val="1165474774"/>
+        <p14:creationId xmlns:p14="http://schemas.microsoft.com/office/powerpoint/2010/main" val="3034765692"/>
       </p:ext>
     </p:extLst>
   </p:cSld>

</xml_diff>

<commit_message>
Update Illustrations (Introduction to LabBench).pptx
</commit_message>
<xml_diff>
--- a/introdemo/Illustrations/Illustrations (Introduction to LabBench).pptx
+++ b/introdemo/Illustrations/Illustrations (Introduction to LabBench).pptx
@@ -5,7 +5,7 @@
     <p:sldMasterId id="2147483648" r:id="rId1"/>
   </p:sldMasterIdLst>
   <p:notesMasterIdLst>
-    <p:notesMasterId r:id="rId15"/>
+    <p:notesMasterId r:id="rId20"/>
   </p:notesMasterIdLst>
   <p:sldIdLst>
     <p:sldId id="256" r:id="rId2"/>
@@ -21,6 +21,11 @@
     <p:sldId id="266" r:id="rId12"/>
     <p:sldId id="267" r:id="rId13"/>
     <p:sldId id="268" r:id="rId14"/>
+    <p:sldId id="270" r:id="rId15"/>
+    <p:sldId id="271" r:id="rId16"/>
+    <p:sldId id="272" r:id="rId17"/>
+    <p:sldId id="273" r:id="rId18"/>
+    <p:sldId id="274" r:id="rId19"/>
   </p:sldIdLst>
   <p:sldSz cx="12192000" cy="6858000"/>
   <p:notesSz cx="6858000" cy="9144000"/>
@@ -209,7 +214,7 @@
           <a:p>
             <a:fld id="{2D646BAE-8E37-4DBA-A74E-0A3DD4A9F90C}" type="datetimeFigureOut">
               <a:rPr lang="en-DK" smtClean="0"/>
-              <a:t>29/12/2024</a:t>
+              <a:t>31/12/2024</a:t>
             </a:fld>
             <a:endParaRPr lang="en-DK"/>
           </a:p>
@@ -714,7 +719,7 @@
           <a:p>
             <a:fld id="{D4C52B10-47AD-4490-8483-919970C343B2}" type="datetimeFigureOut">
               <a:rPr lang="en-DK" smtClean="0"/>
-              <a:t>29/12/2024</a:t>
+              <a:t>31/12/2024</a:t>
             </a:fld>
             <a:endParaRPr lang="en-DK"/>
           </a:p>
@@ -914,7 +919,7 @@
           <a:p>
             <a:fld id="{D4C52B10-47AD-4490-8483-919970C343B2}" type="datetimeFigureOut">
               <a:rPr lang="en-DK" smtClean="0"/>
-              <a:t>29/12/2024</a:t>
+              <a:t>31/12/2024</a:t>
             </a:fld>
             <a:endParaRPr lang="en-DK"/>
           </a:p>
@@ -1124,7 +1129,7 @@
           <a:p>
             <a:fld id="{D4C52B10-47AD-4490-8483-919970C343B2}" type="datetimeFigureOut">
               <a:rPr lang="en-DK" smtClean="0"/>
-              <a:t>29/12/2024</a:t>
+              <a:t>31/12/2024</a:t>
             </a:fld>
             <a:endParaRPr lang="en-DK"/>
           </a:p>
@@ -1324,7 +1329,7 @@
           <a:p>
             <a:fld id="{D4C52B10-47AD-4490-8483-919970C343B2}" type="datetimeFigureOut">
               <a:rPr lang="en-DK" smtClean="0"/>
-              <a:t>29/12/2024</a:t>
+              <a:t>31/12/2024</a:t>
             </a:fld>
             <a:endParaRPr lang="en-DK"/>
           </a:p>
@@ -1600,7 +1605,7 @@
           <a:p>
             <a:fld id="{D4C52B10-47AD-4490-8483-919970C343B2}" type="datetimeFigureOut">
               <a:rPr lang="en-DK" smtClean="0"/>
-              <a:t>29/12/2024</a:t>
+              <a:t>31/12/2024</a:t>
             </a:fld>
             <a:endParaRPr lang="en-DK"/>
           </a:p>
@@ -1868,7 +1873,7 @@
           <a:p>
             <a:fld id="{D4C52B10-47AD-4490-8483-919970C343B2}" type="datetimeFigureOut">
               <a:rPr lang="en-DK" smtClean="0"/>
-              <a:t>29/12/2024</a:t>
+              <a:t>31/12/2024</a:t>
             </a:fld>
             <a:endParaRPr lang="en-DK"/>
           </a:p>
@@ -2283,7 +2288,7 @@
           <a:p>
             <a:fld id="{D4C52B10-47AD-4490-8483-919970C343B2}" type="datetimeFigureOut">
               <a:rPr lang="en-DK" smtClean="0"/>
-              <a:t>29/12/2024</a:t>
+              <a:t>31/12/2024</a:t>
             </a:fld>
             <a:endParaRPr lang="en-DK"/>
           </a:p>
@@ -2425,7 +2430,7 @@
           <a:p>
             <a:fld id="{D4C52B10-47AD-4490-8483-919970C343B2}" type="datetimeFigureOut">
               <a:rPr lang="en-DK" smtClean="0"/>
-              <a:t>29/12/2024</a:t>
+              <a:t>31/12/2024</a:t>
             </a:fld>
             <a:endParaRPr lang="en-DK"/>
           </a:p>
@@ -2538,7 +2543,7 @@
           <a:p>
             <a:fld id="{D4C52B10-47AD-4490-8483-919970C343B2}" type="datetimeFigureOut">
               <a:rPr lang="en-DK" smtClean="0"/>
-              <a:t>29/12/2024</a:t>
+              <a:t>31/12/2024</a:t>
             </a:fld>
             <a:endParaRPr lang="en-DK"/>
           </a:p>
@@ -2851,7 +2856,7 @@
           <a:p>
             <a:fld id="{D4C52B10-47AD-4490-8483-919970C343B2}" type="datetimeFigureOut">
               <a:rPr lang="en-DK" smtClean="0"/>
-              <a:t>29/12/2024</a:t>
+              <a:t>31/12/2024</a:t>
             </a:fld>
             <a:endParaRPr lang="en-DK"/>
           </a:p>
@@ -3140,7 +3145,7 @@
           <a:p>
             <a:fld id="{D4C52B10-47AD-4490-8483-919970C343B2}" type="datetimeFigureOut">
               <a:rPr lang="en-DK" smtClean="0"/>
-              <a:t>29/12/2024</a:t>
+              <a:t>31/12/2024</a:t>
             </a:fld>
             <a:endParaRPr lang="en-DK"/>
           </a:p>
@@ -3383,7 +3388,7 @@
           <a:p>
             <a:fld id="{D4C52B10-47AD-4490-8483-919970C343B2}" type="datetimeFigureOut">
               <a:rPr lang="en-DK" smtClean="0"/>
-              <a:t>29/12/2024</a:t>
+              <a:t>31/12/2024</a:t>
             </a:fld>
             <a:endParaRPr lang="en-DK"/>
           </a:p>
@@ -4906,6 +4911,306 @@
     <p:extLst>
       <p:ext uri="{BB962C8B-B14F-4D97-AF65-F5344CB8AC3E}">
         <p14:creationId xmlns:p14="http://schemas.microsoft.com/office/powerpoint/2010/main" val="3476744341"/>
+      </p:ext>
+    </p:extLst>
+  </p:cSld>
+  <p:clrMapOvr>
+    <a:masterClrMapping/>
+  </p:clrMapOvr>
+</p:sld>
+</file>
+
+<file path=ppt/slides/slide14.xml><?xml version="1.0" encoding="utf-8"?>
+<p:sld xmlns:a="http://schemas.openxmlformats.org/drawingml/2006/main" xmlns:r="http://schemas.openxmlformats.org/officeDocument/2006/relationships" xmlns:p="http://schemas.openxmlformats.org/presentationml/2006/main">
+  <p:cSld>
+    <p:spTree>
+      <p:nvGrpSpPr>
+        <p:cNvPr id="1" name=""/>
+        <p:cNvGrpSpPr/>
+        <p:nvPr/>
+      </p:nvGrpSpPr>
+      <p:grpSpPr>
+        <a:xfrm>
+          <a:off x="0" y="0"/>
+          <a:ext cx="0" cy="0"/>
+          <a:chOff x="0" y="0"/>
+          <a:chExt cx="0" cy="0"/>
+        </a:xfrm>
+      </p:grpSpPr>
+      <p:pic>
+        <p:nvPicPr>
+          <p:cNvPr id="5" name="Picture 4">
+            <a:extLst>
+              <a:ext uri="{FF2B5EF4-FFF2-40B4-BE49-F238E27FC236}">
+                <a16:creationId xmlns:a16="http://schemas.microsoft.com/office/drawing/2014/main" id="{50D4B995-E28F-3301-4C2A-4CDF7D9EEF25}"/>
+              </a:ext>
+            </a:extLst>
+          </p:cNvPr>
+          <p:cNvPicPr>
+            <a:picLocks noChangeAspect="1"/>
+          </p:cNvPicPr>
+          <p:nvPr/>
+        </p:nvPicPr>
+        <p:blipFill>
+          <a:blip r:embed="rId2"/>
+          <a:stretch>
+            <a:fillRect/>
+          </a:stretch>
+        </p:blipFill>
+        <p:spPr>
+          <a:xfrm>
+            <a:off x="3156857" y="0"/>
+            <a:ext cx="5878286" cy="6858000"/>
+          </a:xfrm>
+          <a:prstGeom prst="rect">
+            <a:avLst/>
+          </a:prstGeom>
+        </p:spPr>
+      </p:pic>
+    </p:spTree>
+    <p:extLst>
+      <p:ext uri="{BB962C8B-B14F-4D97-AF65-F5344CB8AC3E}">
+        <p14:creationId xmlns:p14="http://schemas.microsoft.com/office/powerpoint/2010/main" val="4148396750"/>
+      </p:ext>
+    </p:extLst>
+  </p:cSld>
+  <p:clrMapOvr>
+    <a:masterClrMapping/>
+  </p:clrMapOvr>
+</p:sld>
+</file>
+
+<file path=ppt/slides/slide15.xml><?xml version="1.0" encoding="utf-8"?>
+<p:sld xmlns:a="http://schemas.openxmlformats.org/drawingml/2006/main" xmlns:r="http://schemas.openxmlformats.org/officeDocument/2006/relationships" xmlns:p="http://schemas.openxmlformats.org/presentationml/2006/main">
+  <p:cSld>
+    <p:spTree>
+      <p:nvGrpSpPr>
+        <p:cNvPr id="1" name=""/>
+        <p:cNvGrpSpPr/>
+        <p:nvPr/>
+      </p:nvGrpSpPr>
+      <p:grpSpPr>
+        <a:xfrm>
+          <a:off x="0" y="0"/>
+          <a:ext cx="0" cy="0"/>
+          <a:chOff x="0" y="0"/>
+          <a:chExt cx="0" cy="0"/>
+        </a:xfrm>
+      </p:grpSpPr>
+      <p:pic>
+        <p:nvPicPr>
+          <p:cNvPr id="5" name="Picture 4">
+            <a:extLst>
+              <a:ext uri="{FF2B5EF4-FFF2-40B4-BE49-F238E27FC236}">
+                <a16:creationId xmlns:a16="http://schemas.microsoft.com/office/drawing/2014/main" id="{93CAA074-306E-94F4-3ED7-BB4946D61A3B}"/>
+              </a:ext>
+            </a:extLst>
+          </p:cNvPr>
+          <p:cNvPicPr>
+            <a:picLocks noChangeAspect="1"/>
+          </p:cNvPicPr>
+          <p:nvPr/>
+        </p:nvPicPr>
+        <p:blipFill>
+          <a:blip r:embed="rId2"/>
+          <a:stretch>
+            <a:fillRect/>
+          </a:stretch>
+        </p:blipFill>
+        <p:spPr>
+          <a:xfrm>
+            <a:off x="3156857" y="0"/>
+            <a:ext cx="5878286" cy="6858000"/>
+          </a:xfrm>
+          <a:prstGeom prst="rect">
+            <a:avLst/>
+          </a:prstGeom>
+        </p:spPr>
+      </p:pic>
+    </p:spTree>
+    <p:extLst>
+      <p:ext uri="{BB962C8B-B14F-4D97-AF65-F5344CB8AC3E}">
+        <p14:creationId xmlns:p14="http://schemas.microsoft.com/office/powerpoint/2010/main" val="1142021142"/>
+      </p:ext>
+    </p:extLst>
+  </p:cSld>
+  <p:clrMapOvr>
+    <a:masterClrMapping/>
+  </p:clrMapOvr>
+</p:sld>
+</file>
+
+<file path=ppt/slides/slide16.xml><?xml version="1.0" encoding="utf-8"?>
+<p:sld xmlns:a="http://schemas.openxmlformats.org/drawingml/2006/main" xmlns:r="http://schemas.openxmlformats.org/officeDocument/2006/relationships" xmlns:p="http://schemas.openxmlformats.org/presentationml/2006/main">
+  <p:cSld>
+    <p:spTree>
+      <p:nvGrpSpPr>
+        <p:cNvPr id="1" name=""/>
+        <p:cNvGrpSpPr/>
+        <p:nvPr/>
+      </p:nvGrpSpPr>
+      <p:grpSpPr>
+        <a:xfrm>
+          <a:off x="0" y="0"/>
+          <a:ext cx="0" cy="0"/>
+          <a:chOff x="0" y="0"/>
+          <a:chExt cx="0" cy="0"/>
+        </a:xfrm>
+      </p:grpSpPr>
+      <p:pic>
+        <p:nvPicPr>
+          <p:cNvPr id="3" name="Picture 2">
+            <a:extLst>
+              <a:ext uri="{FF2B5EF4-FFF2-40B4-BE49-F238E27FC236}">
+                <a16:creationId xmlns:a16="http://schemas.microsoft.com/office/drawing/2014/main" id="{07A952A0-5DC6-A655-198A-C3E3D4F7D98F}"/>
+              </a:ext>
+            </a:extLst>
+          </p:cNvPr>
+          <p:cNvPicPr>
+            <a:picLocks noChangeAspect="1"/>
+          </p:cNvPicPr>
+          <p:nvPr/>
+        </p:nvPicPr>
+        <p:blipFill>
+          <a:blip r:embed="rId2"/>
+          <a:stretch>
+            <a:fillRect/>
+          </a:stretch>
+        </p:blipFill>
+        <p:spPr>
+          <a:xfrm>
+            <a:off x="3156857" y="0"/>
+            <a:ext cx="5878286" cy="6858000"/>
+          </a:xfrm>
+          <a:prstGeom prst="rect">
+            <a:avLst/>
+          </a:prstGeom>
+        </p:spPr>
+      </p:pic>
+    </p:spTree>
+    <p:extLst>
+      <p:ext uri="{BB962C8B-B14F-4D97-AF65-F5344CB8AC3E}">
+        <p14:creationId xmlns:p14="http://schemas.microsoft.com/office/powerpoint/2010/main" val="408536176"/>
+      </p:ext>
+    </p:extLst>
+  </p:cSld>
+  <p:clrMapOvr>
+    <a:masterClrMapping/>
+  </p:clrMapOvr>
+</p:sld>
+</file>
+
+<file path=ppt/slides/slide17.xml><?xml version="1.0" encoding="utf-8"?>
+<p:sld xmlns:a="http://schemas.openxmlformats.org/drawingml/2006/main" xmlns:r="http://schemas.openxmlformats.org/officeDocument/2006/relationships" xmlns:p="http://schemas.openxmlformats.org/presentationml/2006/main">
+  <p:cSld>
+    <p:spTree>
+      <p:nvGrpSpPr>
+        <p:cNvPr id="1" name=""/>
+        <p:cNvGrpSpPr/>
+        <p:nvPr/>
+      </p:nvGrpSpPr>
+      <p:grpSpPr>
+        <a:xfrm>
+          <a:off x="0" y="0"/>
+          <a:ext cx="0" cy="0"/>
+          <a:chOff x="0" y="0"/>
+          <a:chExt cx="0" cy="0"/>
+        </a:xfrm>
+      </p:grpSpPr>
+      <p:pic>
+        <p:nvPicPr>
+          <p:cNvPr id="3" name="Picture 2">
+            <a:extLst>
+              <a:ext uri="{FF2B5EF4-FFF2-40B4-BE49-F238E27FC236}">
+                <a16:creationId xmlns:a16="http://schemas.microsoft.com/office/drawing/2014/main" id="{3417ED0A-9878-3FE4-F6CE-7BD89B06EA08}"/>
+              </a:ext>
+            </a:extLst>
+          </p:cNvPr>
+          <p:cNvPicPr>
+            <a:picLocks noChangeAspect="1"/>
+          </p:cNvPicPr>
+          <p:nvPr/>
+        </p:nvPicPr>
+        <p:blipFill>
+          <a:blip r:embed="rId2"/>
+          <a:stretch>
+            <a:fillRect/>
+          </a:stretch>
+        </p:blipFill>
+        <p:spPr>
+          <a:xfrm>
+            <a:off x="3156857" y="0"/>
+            <a:ext cx="5878286" cy="6858000"/>
+          </a:xfrm>
+          <a:prstGeom prst="rect">
+            <a:avLst/>
+          </a:prstGeom>
+        </p:spPr>
+      </p:pic>
+    </p:spTree>
+    <p:extLst>
+      <p:ext uri="{BB962C8B-B14F-4D97-AF65-F5344CB8AC3E}">
+        <p14:creationId xmlns:p14="http://schemas.microsoft.com/office/powerpoint/2010/main" val="2682983898"/>
+      </p:ext>
+    </p:extLst>
+  </p:cSld>
+  <p:clrMapOvr>
+    <a:masterClrMapping/>
+  </p:clrMapOvr>
+</p:sld>
+</file>
+
+<file path=ppt/slides/slide18.xml><?xml version="1.0" encoding="utf-8"?>
+<p:sld xmlns:a="http://schemas.openxmlformats.org/drawingml/2006/main" xmlns:r="http://schemas.openxmlformats.org/officeDocument/2006/relationships" xmlns:p="http://schemas.openxmlformats.org/presentationml/2006/main">
+  <p:cSld>
+    <p:spTree>
+      <p:nvGrpSpPr>
+        <p:cNvPr id="1" name=""/>
+        <p:cNvGrpSpPr/>
+        <p:nvPr/>
+      </p:nvGrpSpPr>
+      <p:grpSpPr>
+        <a:xfrm>
+          <a:off x="0" y="0"/>
+          <a:ext cx="0" cy="0"/>
+          <a:chOff x="0" y="0"/>
+          <a:chExt cx="0" cy="0"/>
+        </a:xfrm>
+      </p:grpSpPr>
+      <p:pic>
+        <p:nvPicPr>
+          <p:cNvPr id="3" name="Picture 2">
+            <a:extLst>
+              <a:ext uri="{FF2B5EF4-FFF2-40B4-BE49-F238E27FC236}">
+                <a16:creationId xmlns:a16="http://schemas.microsoft.com/office/drawing/2014/main" id="{082D3BA2-CC2A-E723-EC7D-E2C2CF2AEDBF}"/>
+              </a:ext>
+            </a:extLst>
+          </p:cNvPr>
+          <p:cNvPicPr>
+            <a:picLocks noChangeAspect="1"/>
+          </p:cNvPicPr>
+          <p:nvPr/>
+        </p:nvPicPr>
+        <p:blipFill>
+          <a:blip r:embed="rId2"/>
+          <a:stretch>
+            <a:fillRect/>
+          </a:stretch>
+        </p:blipFill>
+        <p:spPr>
+          <a:xfrm>
+            <a:off x="3068064" y="1005840"/>
+            <a:ext cx="6288020" cy="4137660"/>
+          </a:xfrm>
+          <a:prstGeom prst="rect">
+            <a:avLst/>
+          </a:prstGeom>
+        </p:spPr>
+      </p:pic>
+    </p:spTree>
+    <p:extLst>
+      <p:ext uri="{BB962C8B-B14F-4D97-AF65-F5344CB8AC3E}">
+        <p14:creationId xmlns:p14="http://schemas.microsoft.com/office/powerpoint/2010/main" val="4155984765"/>
       </p:ext>
     </p:extLst>
   </p:cSld>

</xml_diff>